<commit_message>
Made a quick character-less version of the title art. Added it as backgrounds in the powerpoints; we'll have to fix further designs monday.
</commit_message>
<xml_diff>
--- a/Documentation/nightlight Presentation - base.pptx
+++ b/Documentation/nightlight Presentation - base.pptx
@@ -111,6 +111,11 @@
       </a:defRPr>
     </a:lvl9pPr>
   </p:defaultTextStyle>
+  <p:extLst>
+    <p:ext uri="{EFAFB233-063F-42B5-8137-9DF3F51BA10A}">
+      <p15:sldGuideLst xmlns:p15="http://schemas.microsoft.com/office/powerpoint/2012/main"/>
+    </p:ext>
+  </p:extLst>
 </p:presentation>
 </file>
 
@@ -3191,6 +3196,35 @@
           <a:chExt cx="0" cy="0"/>
         </a:xfrm>
       </p:grpSpPr>
+      <p:pic>
+        <p:nvPicPr>
+          <p:cNvPr id="4" name="Platshållare för innehåll 3"/>
+          <p:cNvPicPr>
+            <a:picLocks noGrp="1" noChangeAspect="1"/>
+          </p:cNvPicPr>
+          <p:nvPr>
+            <p:ph idx="1"/>
+          </p:nvPr>
+        </p:nvPicPr>
+        <p:blipFill>
+          <a:blip r:embed="rId2">
+            <a:extLst>
+              <a:ext uri="{28A0092B-C50C-407E-A947-70E740481C1C}">
+                <a14:useLocalDpi xmlns:a14="http://schemas.microsoft.com/office/drawing/2010/main" val="0"/>
+              </a:ext>
+            </a:extLst>
+          </a:blip>
+          <a:stretch>
+            <a:fillRect/>
+          </a:stretch>
+        </p:blipFill>
+        <p:spPr>
+          <a:xfrm>
+            <a:off x="0" y="-678872"/>
+            <a:ext cx="12211520" cy="7675418"/>
+          </a:xfrm>
+        </p:spPr>
+      </p:pic>
       <p:sp>
         <p:nvSpPr>
           <p:cNvPr id="2" name="Rubrik 1"/>
@@ -3207,29 +3241,22 @@
           <a:lstStyle/>
           <a:p>
             <a:r>
-              <a:rPr lang="sv-SE" dirty="0" smtClean="0"/>
+              <a:rPr lang="sv-SE" dirty="0" smtClean="0">
+                <a:solidFill>
+                  <a:schemeClr val="bg1">
+                    <a:lumMod val="65000"/>
+                  </a:schemeClr>
+                </a:solidFill>
+              </a:rPr>
               <a:t>Filmklipp</a:t>
             </a:r>
-            <a:endParaRPr lang="sv-SE" dirty="0"/>
-          </a:p>
-        </p:txBody>
-      </p:sp>
-      <p:sp>
-        <p:nvSpPr>
-          <p:cNvPr id="3" name="Platshållare för innehåll 2"/>
-          <p:cNvSpPr>
-            <a:spLocks noGrp="1"/>
-          </p:cNvSpPr>
-          <p:nvPr>
-            <p:ph idx="1"/>
-          </p:nvPr>
-        </p:nvSpPr>
-        <p:spPr/>
-        <p:txBody>
-          <a:bodyPr/>
-          <a:lstStyle/>
-          <a:p>
-            <a:endParaRPr lang="sv-SE"/>
+            <a:endParaRPr lang="sv-SE" dirty="0">
+              <a:solidFill>
+                <a:schemeClr val="bg1">
+                  <a:lumMod val="65000"/>
+                </a:schemeClr>
+              </a:solidFill>
+            </a:endParaRPr>
           </a:p>
         </p:txBody>
       </p:sp>
@@ -3270,6 +3297,36 @@
           <a:chExt cx="0" cy="0"/>
         </a:xfrm>
       </p:grpSpPr>
+      <p:pic>
+        <p:nvPicPr>
+          <p:cNvPr id="4" name="Platshållare för innehåll 3"/>
+          <p:cNvPicPr>
+            <a:picLocks noChangeAspect="1"/>
+          </p:cNvPicPr>
+          <p:nvPr/>
+        </p:nvPicPr>
+        <p:blipFill>
+          <a:blip r:embed="rId2">
+            <a:extLst>
+              <a:ext uri="{28A0092B-C50C-407E-A947-70E740481C1C}">
+                <a14:useLocalDpi xmlns:a14="http://schemas.microsoft.com/office/drawing/2010/main" val="0"/>
+              </a:ext>
+            </a:extLst>
+          </a:blip>
+          <a:stretch>
+            <a:fillRect/>
+          </a:stretch>
+        </p:blipFill>
+        <p:spPr>
+          <a:xfrm>
+            <a:off x="0" y="-678872"/>
+            <a:ext cx="12211520" cy="7675418"/>
+          </a:xfrm>
+          <a:prstGeom prst="rect">
+            <a:avLst/>
+          </a:prstGeom>
+        </p:spPr>
+      </p:pic>
       <p:sp>
         <p:nvSpPr>
           <p:cNvPr id="2" name="Rubrik 1"/>
@@ -3286,10 +3343,22 @@
           <a:lstStyle/>
           <a:p>
             <a:r>
-              <a:rPr lang="sv-SE" dirty="0" smtClean="0"/>
+              <a:rPr lang="sv-SE" dirty="0" smtClean="0">
+                <a:solidFill>
+                  <a:schemeClr val="bg1">
+                    <a:lumMod val="65000"/>
+                  </a:schemeClr>
+                </a:solidFill>
+              </a:rPr>
               <a:t>Grafik</a:t>
             </a:r>
-            <a:endParaRPr lang="sv-SE" dirty="0"/>
+            <a:endParaRPr lang="sv-SE" dirty="0">
+              <a:solidFill>
+                <a:schemeClr val="bg1">
+                  <a:lumMod val="65000"/>
+                </a:schemeClr>
+              </a:solidFill>
+            </a:endParaRPr>
           </a:p>
         </p:txBody>
       </p:sp>
@@ -3308,7 +3377,13 @@
           <a:bodyPr/>
           <a:lstStyle/>
           <a:p>
-            <a:endParaRPr lang="sv-SE"/>
+            <a:endParaRPr lang="sv-SE" dirty="0">
+              <a:solidFill>
+                <a:schemeClr val="bg1">
+                  <a:lumMod val="65000"/>
+                </a:schemeClr>
+              </a:solidFill>
+            </a:endParaRPr>
           </a:p>
         </p:txBody>
       </p:sp>
@@ -3349,6 +3424,36 @@
           <a:chExt cx="0" cy="0"/>
         </a:xfrm>
       </p:grpSpPr>
+      <p:pic>
+        <p:nvPicPr>
+          <p:cNvPr id="4" name="Platshållare för innehåll 3"/>
+          <p:cNvPicPr>
+            <a:picLocks noChangeAspect="1"/>
+          </p:cNvPicPr>
+          <p:nvPr/>
+        </p:nvPicPr>
+        <p:blipFill>
+          <a:blip r:embed="rId2">
+            <a:extLst>
+              <a:ext uri="{28A0092B-C50C-407E-A947-70E740481C1C}">
+                <a14:useLocalDpi xmlns:a14="http://schemas.microsoft.com/office/drawing/2010/main" val="0"/>
+              </a:ext>
+            </a:extLst>
+          </a:blip>
+          <a:stretch>
+            <a:fillRect/>
+          </a:stretch>
+        </p:blipFill>
+        <p:spPr>
+          <a:xfrm>
+            <a:off x="0" y="-678872"/>
+            <a:ext cx="12211520" cy="7675418"/>
+          </a:xfrm>
+          <a:prstGeom prst="rect">
+            <a:avLst/>
+          </a:prstGeom>
+        </p:spPr>
+      </p:pic>
       <p:sp>
         <p:nvSpPr>
           <p:cNvPr id="2" name="Rubrik 1"/>
@@ -3365,10 +3470,22 @@
           <a:lstStyle/>
           <a:p>
             <a:r>
-              <a:rPr lang="sv-SE" dirty="0" smtClean="0"/>
+              <a:rPr lang="sv-SE" dirty="0" smtClean="0">
+                <a:solidFill>
+                  <a:schemeClr val="bg1">
+                    <a:lumMod val="65000"/>
+                  </a:schemeClr>
+                </a:solidFill>
+              </a:rPr>
               <a:t>Asset Manager</a:t>
             </a:r>
-            <a:endParaRPr lang="sv-SE" dirty="0"/>
+            <a:endParaRPr lang="sv-SE" dirty="0">
+              <a:solidFill>
+                <a:schemeClr val="bg1">
+                  <a:lumMod val="65000"/>
+                </a:schemeClr>
+              </a:solidFill>
+            </a:endParaRPr>
           </a:p>
         </p:txBody>
       </p:sp>
@@ -3387,7 +3504,13 @@
           <a:bodyPr/>
           <a:lstStyle/>
           <a:p>
-            <a:endParaRPr lang="sv-SE"/>
+            <a:endParaRPr lang="sv-SE" dirty="0">
+              <a:solidFill>
+                <a:schemeClr val="bg1">
+                  <a:lumMod val="65000"/>
+                </a:schemeClr>
+              </a:solidFill>
+            </a:endParaRPr>
           </a:p>
         </p:txBody>
       </p:sp>
@@ -3428,6 +3551,36 @@
           <a:chExt cx="0" cy="0"/>
         </a:xfrm>
       </p:grpSpPr>
+      <p:pic>
+        <p:nvPicPr>
+          <p:cNvPr id="4" name="Platshållare för innehåll 3"/>
+          <p:cNvPicPr>
+            <a:picLocks noChangeAspect="1"/>
+          </p:cNvPicPr>
+          <p:nvPr/>
+        </p:nvPicPr>
+        <p:blipFill>
+          <a:blip r:embed="rId2">
+            <a:extLst>
+              <a:ext uri="{28A0092B-C50C-407E-A947-70E740481C1C}">
+                <a14:useLocalDpi xmlns:a14="http://schemas.microsoft.com/office/drawing/2010/main" val="0"/>
+              </a:ext>
+            </a:extLst>
+          </a:blip>
+          <a:stretch>
+            <a:fillRect/>
+          </a:stretch>
+        </p:blipFill>
+        <p:spPr>
+          <a:xfrm>
+            <a:off x="0" y="-678872"/>
+            <a:ext cx="12211520" cy="7675418"/>
+          </a:xfrm>
+          <a:prstGeom prst="rect">
+            <a:avLst/>
+          </a:prstGeom>
+        </p:spPr>
+      </p:pic>
       <p:sp>
         <p:nvSpPr>
           <p:cNvPr id="2" name="Rubrik 1"/>
@@ -3444,10 +3597,22 @@
           <a:lstStyle/>
           <a:p>
             <a:r>
-              <a:rPr lang="sv-SE" dirty="0" err="1" smtClean="0"/>
+              <a:rPr lang="sv-SE" dirty="0" err="1" smtClean="0">
+                <a:solidFill>
+                  <a:schemeClr val="bg1">
+                    <a:lumMod val="65000"/>
+                  </a:schemeClr>
+                </a:solidFill>
+              </a:rPr>
               <a:t>Levelformat</a:t>
             </a:r>
-            <a:endParaRPr lang="sv-SE" dirty="0"/>
+            <a:endParaRPr lang="sv-SE" dirty="0">
+              <a:solidFill>
+                <a:schemeClr val="bg1">
+                  <a:lumMod val="65000"/>
+                </a:schemeClr>
+              </a:solidFill>
+            </a:endParaRPr>
           </a:p>
         </p:txBody>
       </p:sp>
@@ -3466,7 +3631,13 @@
           <a:bodyPr/>
           <a:lstStyle/>
           <a:p>
-            <a:endParaRPr lang="sv-SE"/>
+            <a:endParaRPr lang="sv-SE" dirty="0">
+              <a:solidFill>
+                <a:schemeClr val="bg1">
+                  <a:lumMod val="65000"/>
+                </a:schemeClr>
+              </a:solidFill>
+            </a:endParaRPr>
           </a:p>
         </p:txBody>
       </p:sp>
@@ -3507,6 +3678,36 @@
           <a:chExt cx="0" cy="0"/>
         </a:xfrm>
       </p:grpSpPr>
+      <p:pic>
+        <p:nvPicPr>
+          <p:cNvPr id="4" name="Platshållare för innehåll 3"/>
+          <p:cNvPicPr>
+            <a:picLocks noChangeAspect="1"/>
+          </p:cNvPicPr>
+          <p:nvPr/>
+        </p:nvPicPr>
+        <p:blipFill>
+          <a:blip r:embed="rId2">
+            <a:extLst>
+              <a:ext uri="{28A0092B-C50C-407E-A947-70E740481C1C}">
+                <a14:useLocalDpi xmlns:a14="http://schemas.microsoft.com/office/drawing/2010/main" val="0"/>
+              </a:ext>
+            </a:extLst>
+          </a:blip>
+          <a:stretch>
+            <a:fillRect/>
+          </a:stretch>
+        </p:blipFill>
+        <p:spPr>
+          <a:xfrm>
+            <a:off x="0" y="-678872"/>
+            <a:ext cx="12211520" cy="7675418"/>
+          </a:xfrm>
+          <a:prstGeom prst="rect">
+            <a:avLst/>
+          </a:prstGeom>
+        </p:spPr>
+      </p:pic>
       <p:sp>
         <p:nvSpPr>
           <p:cNvPr id="2" name="Rubrik 1"/>
@@ -3523,10 +3724,22 @@
           <a:lstStyle/>
           <a:p>
             <a:r>
-              <a:rPr lang="sv-SE" dirty="0" smtClean="0"/>
+              <a:rPr lang="sv-SE" dirty="0" smtClean="0">
+                <a:solidFill>
+                  <a:schemeClr val="bg1">
+                    <a:lumMod val="65000"/>
+                  </a:schemeClr>
+                </a:solidFill>
+              </a:rPr>
               <a:t>Ljus</a:t>
             </a:r>
-            <a:endParaRPr lang="sv-SE" dirty="0"/>
+            <a:endParaRPr lang="sv-SE" dirty="0">
+              <a:solidFill>
+                <a:schemeClr val="bg1">
+                  <a:lumMod val="65000"/>
+                </a:schemeClr>
+              </a:solidFill>
+            </a:endParaRPr>
           </a:p>
         </p:txBody>
       </p:sp>
@@ -3545,7 +3758,13 @@
           <a:bodyPr/>
           <a:lstStyle/>
           <a:p>
-            <a:endParaRPr lang="sv-SE"/>
+            <a:endParaRPr lang="sv-SE" dirty="0">
+              <a:solidFill>
+                <a:schemeClr val="bg1">
+                  <a:lumMod val="65000"/>
+                </a:schemeClr>
+              </a:solidFill>
+            </a:endParaRPr>
           </a:p>
         </p:txBody>
       </p:sp>
@@ -3586,6 +3805,36 @@
           <a:chExt cx="0" cy="0"/>
         </a:xfrm>
       </p:grpSpPr>
+      <p:pic>
+        <p:nvPicPr>
+          <p:cNvPr id="4" name="Platshållare för innehåll 3"/>
+          <p:cNvPicPr>
+            <a:picLocks noChangeAspect="1"/>
+          </p:cNvPicPr>
+          <p:nvPr/>
+        </p:nvPicPr>
+        <p:blipFill>
+          <a:blip r:embed="rId2">
+            <a:extLst>
+              <a:ext uri="{28A0092B-C50C-407E-A947-70E740481C1C}">
+                <a14:useLocalDpi xmlns:a14="http://schemas.microsoft.com/office/drawing/2010/main" val="0"/>
+              </a:ext>
+            </a:extLst>
+          </a:blip>
+          <a:stretch>
+            <a:fillRect/>
+          </a:stretch>
+        </p:blipFill>
+        <p:spPr>
+          <a:xfrm>
+            <a:off x="0" y="-678872"/>
+            <a:ext cx="12211520" cy="7675418"/>
+          </a:xfrm>
+          <a:prstGeom prst="rect">
+            <a:avLst/>
+          </a:prstGeom>
+        </p:spPr>
+      </p:pic>
       <p:sp>
         <p:nvSpPr>
           <p:cNvPr id="2" name="Rubrik 1"/>
@@ -3602,10 +3851,22 @@
           <a:lstStyle/>
           <a:p>
             <a:r>
-              <a:rPr lang="sv-SE" dirty="0" err="1" smtClean="0"/>
+              <a:rPr lang="sv-SE" dirty="0" err="1" smtClean="0">
+                <a:solidFill>
+                  <a:schemeClr val="bg1">
+                    <a:lumMod val="65000"/>
+                  </a:schemeClr>
+                </a:solidFill>
+              </a:rPr>
               <a:t>Gamelogic</a:t>
             </a:r>
-            <a:endParaRPr lang="sv-SE" dirty="0"/>
+            <a:endParaRPr lang="sv-SE" dirty="0">
+              <a:solidFill>
+                <a:schemeClr val="bg1">
+                  <a:lumMod val="65000"/>
+                </a:schemeClr>
+              </a:solidFill>
+            </a:endParaRPr>
           </a:p>
         </p:txBody>
       </p:sp>
@@ -3624,7 +3885,13 @@
           <a:bodyPr/>
           <a:lstStyle/>
           <a:p>
-            <a:endParaRPr lang="sv-SE"/>
+            <a:endParaRPr lang="sv-SE" dirty="0">
+              <a:solidFill>
+                <a:schemeClr val="bg1">
+                  <a:lumMod val="65000"/>
+                </a:schemeClr>
+              </a:solidFill>
+            </a:endParaRPr>
           </a:p>
         </p:txBody>
       </p:sp>
@@ -3665,6 +3932,36 @@
           <a:chExt cx="0" cy="0"/>
         </a:xfrm>
       </p:grpSpPr>
+      <p:pic>
+        <p:nvPicPr>
+          <p:cNvPr id="4" name="Platshållare för innehåll 3"/>
+          <p:cNvPicPr>
+            <a:picLocks noChangeAspect="1"/>
+          </p:cNvPicPr>
+          <p:nvPr/>
+        </p:nvPicPr>
+        <p:blipFill>
+          <a:blip r:embed="rId2">
+            <a:extLst>
+              <a:ext uri="{28A0092B-C50C-407E-A947-70E740481C1C}">
+                <a14:useLocalDpi xmlns:a14="http://schemas.microsoft.com/office/drawing/2010/main" val="0"/>
+              </a:ext>
+            </a:extLst>
+          </a:blip>
+          <a:stretch>
+            <a:fillRect/>
+          </a:stretch>
+        </p:blipFill>
+        <p:spPr>
+          <a:xfrm>
+            <a:off x="0" y="-678872"/>
+            <a:ext cx="12211520" cy="7675418"/>
+          </a:xfrm>
+          <a:prstGeom prst="rect">
+            <a:avLst/>
+          </a:prstGeom>
+        </p:spPr>
+      </p:pic>
       <p:sp>
         <p:nvSpPr>
           <p:cNvPr id="2" name="Rubrik 1"/>
@@ -3681,10 +3978,22 @@
           <a:lstStyle/>
           <a:p>
             <a:r>
-              <a:rPr lang="sv-SE" dirty="0" smtClean="0"/>
+              <a:rPr lang="sv-SE" dirty="0" smtClean="0">
+                <a:solidFill>
+                  <a:schemeClr val="bg1">
+                    <a:lumMod val="65000"/>
+                  </a:schemeClr>
+                </a:solidFill>
+              </a:rPr>
               <a:t>AI</a:t>
             </a:r>
-            <a:endParaRPr lang="sv-SE" dirty="0"/>
+            <a:endParaRPr lang="sv-SE" dirty="0">
+              <a:solidFill>
+                <a:schemeClr val="bg1">
+                  <a:lumMod val="65000"/>
+                </a:schemeClr>
+              </a:solidFill>
+            </a:endParaRPr>
           </a:p>
         </p:txBody>
       </p:sp>
@@ -3703,7 +4012,13 @@
           <a:bodyPr/>
           <a:lstStyle/>
           <a:p>
-            <a:endParaRPr lang="sv-SE"/>
+            <a:endParaRPr lang="sv-SE" dirty="0">
+              <a:solidFill>
+                <a:schemeClr val="bg1">
+                  <a:lumMod val="65000"/>
+                </a:schemeClr>
+              </a:solidFill>
+            </a:endParaRPr>
           </a:p>
         </p:txBody>
       </p:sp>

</xml_diff>

<commit_message>
Changed my slide in the powerpoint.
</commit_message>
<xml_diff>
--- a/Documentation/nightlight Presentation - base.pptx
+++ b/Documentation/nightlight Presentation - base.pptx
@@ -250,7 +250,7 @@
           <a:p>
             <a:fld id="{E4496EF8-A5FA-4279-BC3C-3C8521004B86}" type="datetimeFigureOut">
               <a:rPr lang="sv-SE" smtClean="0"/>
-              <a:t>2015-05-24</a:t>
+              <a:t>2015-05-25</a:t>
             </a:fld>
             <a:endParaRPr lang="sv-SE"/>
           </a:p>
@@ -420,7 +420,7 @@
           <a:p>
             <a:fld id="{E4496EF8-A5FA-4279-BC3C-3C8521004B86}" type="datetimeFigureOut">
               <a:rPr lang="sv-SE" smtClean="0"/>
-              <a:t>2015-05-24</a:t>
+              <a:t>2015-05-25</a:t>
             </a:fld>
             <a:endParaRPr lang="sv-SE"/>
           </a:p>
@@ -600,7 +600,7 @@
           <a:p>
             <a:fld id="{E4496EF8-A5FA-4279-BC3C-3C8521004B86}" type="datetimeFigureOut">
               <a:rPr lang="sv-SE" smtClean="0"/>
-              <a:t>2015-05-24</a:t>
+              <a:t>2015-05-25</a:t>
             </a:fld>
             <a:endParaRPr lang="sv-SE"/>
           </a:p>
@@ -770,7 +770,7 @@
           <a:p>
             <a:fld id="{E4496EF8-A5FA-4279-BC3C-3C8521004B86}" type="datetimeFigureOut">
               <a:rPr lang="sv-SE" smtClean="0"/>
-              <a:t>2015-05-24</a:t>
+              <a:t>2015-05-25</a:t>
             </a:fld>
             <a:endParaRPr lang="sv-SE"/>
           </a:p>
@@ -1016,7 +1016,7 @@
           <a:p>
             <a:fld id="{E4496EF8-A5FA-4279-BC3C-3C8521004B86}" type="datetimeFigureOut">
               <a:rPr lang="sv-SE" smtClean="0"/>
-              <a:t>2015-05-24</a:t>
+              <a:t>2015-05-25</a:t>
             </a:fld>
             <a:endParaRPr lang="sv-SE"/>
           </a:p>
@@ -1248,7 +1248,7 @@
           <a:p>
             <a:fld id="{E4496EF8-A5FA-4279-BC3C-3C8521004B86}" type="datetimeFigureOut">
               <a:rPr lang="sv-SE" smtClean="0"/>
-              <a:t>2015-05-24</a:t>
+              <a:t>2015-05-25</a:t>
             </a:fld>
             <a:endParaRPr lang="sv-SE"/>
           </a:p>
@@ -1615,7 +1615,7 @@
           <a:p>
             <a:fld id="{E4496EF8-A5FA-4279-BC3C-3C8521004B86}" type="datetimeFigureOut">
               <a:rPr lang="sv-SE" smtClean="0"/>
-              <a:t>2015-05-24</a:t>
+              <a:t>2015-05-25</a:t>
             </a:fld>
             <a:endParaRPr lang="sv-SE"/>
           </a:p>
@@ -1733,7 +1733,7 @@
           <a:p>
             <a:fld id="{E4496EF8-A5FA-4279-BC3C-3C8521004B86}" type="datetimeFigureOut">
               <a:rPr lang="sv-SE" smtClean="0"/>
-              <a:t>2015-05-24</a:t>
+              <a:t>2015-05-25</a:t>
             </a:fld>
             <a:endParaRPr lang="sv-SE"/>
           </a:p>
@@ -1828,7 +1828,7 @@
           <a:p>
             <a:fld id="{E4496EF8-A5FA-4279-BC3C-3C8521004B86}" type="datetimeFigureOut">
               <a:rPr lang="sv-SE" smtClean="0"/>
-              <a:t>2015-05-24</a:t>
+              <a:t>2015-05-25</a:t>
             </a:fld>
             <a:endParaRPr lang="sv-SE"/>
           </a:p>
@@ -2105,7 +2105,7 @@
           <a:p>
             <a:fld id="{E4496EF8-A5FA-4279-BC3C-3C8521004B86}" type="datetimeFigureOut">
               <a:rPr lang="sv-SE" smtClean="0"/>
-              <a:t>2015-05-24</a:t>
+              <a:t>2015-05-25</a:t>
             </a:fld>
             <a:endParaRPr lang="sv-SE"/>
           </a:p>
@@ -2358,7 +2358,7 @@
           <a:p>
             <a:fld id="{E4496EF8-A5FA-4279-BC3C-3C8521004B86}" type="datetimeFigureOut">
               <a:rPr lang="sv-SE" smtClean="0"/>
-              <a:t>2015-05-24</a:t>
+              <a:t>2015-05-25</a:t>
             </a:fld>
             <a:endParaRPr lang="sv-SE"/>
           </a:p>
@@ -2571,7 +2571,7 @@
           <a:p>
             <a:fld id="{E4496EF8-A5FA-4279-BC3C-3C8521004B86}" type="datetimeFigureOut">
               <a:rPr lang="sv-SE" smtClean="0"/>
-              <a:t>2015-05-24</a:t>
+              <a:t>2015-05-25</a:t>
             </a:fld>
             <a:endParaRPr lang="sv-SE"/>
           </a:p>
@@ -3597,12 +3597,20 @@
           <a:lstStyle/>
           <a:p>
             <a:r>
-              <a:rPr lang="sv-SE" dirty="0" err="1" smtClean="0">
+              <a:rPr lang="sv-SE" dirty="0" smtClean="0">
                 <a:solidFill>
                   <a:schemeClr val="bg1">
                     <a:lumMod val="65000"/>
                   </a:schemeClr>
                 </a:solidFill>
+                <a:effectLst>
+                  <a:outerShdw blurRad="38100" dist="38100" dir="2700000" algn="tl">
+                    <a:srgbClr val="000000">
+                      <a:alpha val="43137"/>
+                    </a:srgbClr>
+                  </a:outerShdw>
+                </a:effectLst>
+                <a:latin typeface="Eras Light ITC" panose="020B0402030504020804" pitchFamily="34" charset="0"/>
               </a:rPr>
               <a:t>Levelformat</a:t>
             </a:r>
@@ -3612,35 +3620,196 @@
                   <a:lumMod val="65000"/>
                 </a:schemeClr>
               </a:solidFill>
+              <a:effectLst>
+                <a:outerShdw blurRad="38100" dist="38100" dir="2700000" algn="tl">
+                  <a:srgbClr val="000000">
+                    <a:alpha val="43137"/>
+                  </a:srgbClr>
+                </a:outerShdw>
+              </a:effectLst>
+              <a:latin typeface="Eras Light ITC" panose="020B0402030504020804" pitchFamily="34" charset="0"/>
             </a:endParaRPr>
           </a:p>
         </p:txBody>
       </p:sp>
-      <p:sp>
-        <p:nvSpPr>
-          <p:cNvPr id="3" name="Platshållare för innehåll 2"/>
-          <p:cNvSpPr>
-            <a:spLocks noGrp="1"/>
-          </p:cNvSpPr>
+      <p:pic>
+        <p:nvPicPr>
+          <p:cNvPr id="5" name="Platshållare för innehåll 4"/>
+          <p:cNvPicPr>
+            <a:picLocks noGrp="1" noChangeAspect="1"/>
+          </p:cNvPicPr>
           <p:nvPr>
             <p:ph idx="1"/>
           </p:nvPr>
-        </p:nvSpPr>
-        <p:spPr/>
-        <p:txBody>
-          <a:bodyPr/>
-          <a:lstStyle/>
-          <a:p>
-            <a:endParaRPr lang="sv-SE" dirty="0">
-              <a:solidFill>
-                <a:schemeClr val="bg1">
-                  <a:lumMod val="65000"/>
-                </a:schemeClr>
-              </a:solidFill>
-            </a:endParaRPr>
-          </a:p>
-        </p:txBody>
-      </p:sp>
+        </p:nvPicPr>
+        <p:blipFill>
+          <a:blip r:embed="rId3">
+            <a:extLst>
+              <a:ext uri="{28A0092B-C50C-407E-A947-70E740481C1C}">
+                <a14:useLocalDpi xmlns:a14="http://schemas.microsoft.com/office/drawing/2010/main" val="0"/>
+              </a:ext>
+            </a:extLst>
+          </a:blip>
+          <a:stretch>
+            <a:fillRect/>
+          </a:stretch>
+        </p:blipFill>
+        <p:spPr>
+          <a:xfrm>
+            <a:off x="4398431" y="610208"/>
+            <a:ext cx="6425395" cy="4351338"/>
+          </a:xfrm>
+          <a:prstGeom prst="rect">
+            <a:avLst/>
+          </a:prstGeom>
+          <a:ln w="38100" cap="sq">
+            <a:solidFill>
+              <a:srgbClr val="000000"/>
+            </a:solidFill>
+            <a:prstDash val="solid"/>
+            <a:miter lim="800000"/>
+          </a:ln>
+          <a:effectLst>
+            <a:outerShdw blurRad="50800" dist="38100" dir="2700000" algn="tl" rotWithShape="0">
+              <a:srgbClr val="000000">
+                <a:alpha val="43000"/>
+              </a:srgbClr>
+            </a:outerShdw>
+          </a:effectLst>
+        </p:spPr>
+      </p:pic>
+      <p:pic>
+        <p:nvPicPr>
+          <p:cNvPr id="6" name="Bildobjekt 5"/>
+          <p:cNvPicPr>
+            <a:picLocks noChangeAspect="1"/>
+          </p:cNvPicPr>
+          <p:nvPr/>
+        </p:nvPicPr>
+        <p:blipFill>
+          <a:blip r:embed="rId4">
+            <a:extLst>
+              <a:ext uri="{28A0092B-C50C-407E-A947-70E740481C1C}">
+                <a14:useLocalDpi xmlns:a14="http://schemas.microsoft.com/office/drawing/2010/main" val="0"/>
+              </a:ext>
+            </a:extLst>
+          </a:blip>
+          <a:stretch>
+            <a:fillRect/>
+          </a:stretch>
+        </p:blipFill>
+        <p:spPr>
+          <a:xfrm>
+            <a:off x="1242981" y="2980915"/>
+            <a:ext cx="2953224" cy="789631"/>
+          </a:xfrm>
+          <a:prstGeom prst="rect">
+            <a:avLst/>
+          </a:prstGeom>
+          <a:ln w="38100" cap="sq">
+            <a:solidFill>
+              <a:srgbClr val="000000"/>
+            </a:solidFill>
+            <a:prstDash val="solid"/>
+            <a:miter lim="800000"/>
+          </a:ln>
+          <a:effectLst>
+            <a:outerShdw blurRad="50800" dist="38100" dir="2700000" algn="tl" rotWithShape="0">
+              <a:srgbClr val="000000">
+                <a:alpha val="43000"/>
+              </a:srgbClr>
+            </a:outerShdw>
+          </a:effectLst>
+        </p:spPr>
+      </p:pic>
+      <p:pic>
+        <p:nvPicPr>
+          <p:cNvPr id="7" name="Bildobjekt 6"/>
+          <p:cNvPicPr>
+            <a:picLocks noChangeAspect="1"/>
+          </p:cNvPicPr>
+          <p:nvPr/>
+        </p:nvPicPr>
+        <p:blipFill>
+          <a:blip r:embed="rId5">
+            <a:extLst>
+              <a:ext uri="{28A0092B-C50C-407E-A947-70E740481C1C}">
+                <a14:useLocalDpi xmlns:a14="http://schemas.microsoft.com/office/drawing/2010/main" val="0"/>
+              </a:ext>
+            </a:extLst>
+          </a:blip>
+          <a:stretch>
+            <a:fillRect/>
+          </a:stretch>
+        </p:blipFill>
+        <p:spPr>
+          <a:xfrm>
+            <a:off x="1242981" y="5060773"/>
+            <a:ext cx="9580845" cy="656013"/>
+          </a:xfrm>
+          <a:prstGeom prst="rect">
+            <a:avLst/>
+          </a:prstGeom>
+          <a:ln w="38100" cap="sq">
+            <a:solidFill>
+              <a:srgbClr val="000000"/>
+            </a:solidFill>
+            <a:prstDash val="solid"/>
+            <a:miter lim="800000"/>
+          </a:ln>
+          <a:effectLst>
+            <a:outerShdw blurRad="50800" dist="38100" dir="2700000" algn="tl" rotWithShape="0">
+              <a:srgbClr val="000000">
+                <a:alpha val="43000"/>
+              </a:srgbClr>
+            </a:outerShdw>
+          </a:effectLst>
+        </p:spPr>
+      </p:pic>
+      <p:pic>
+        <p:nvPicPr>
+          <p:cNvPr id="8" name="Bildobjekt 7"/>
+          <p:cNvPicPr>
+            <a:picLocks noChangeAspect="1"/>
+          </p:cNvPicPr>
+          <p:nvPr/>
+        </p:nvPicPr>
+        <p:blipFill>
+          <a:blip r:embed="rId6">
+            <a:extLst>
+              <a:ext uri="{28A0092B-C50C-407E-A947-70E740481C1C}">
+                <a14:useLocalDpi xmlns:a14="http://schemas.microsoft.com/office/drawing/2010/main" val="0"/>
+              </a:ext>
+            </a:extLst>
+          </a:blip>
+          <a:stretch>
+            <a:fillRect/>
+          </a:stretch>
+        </p:blipFill>
+        <p:spPr>
+          <a:xfrm>
+            <a:off x="1242981" y="5913336"/>
+            <a:ext cx="9580845" cy="531531"/>
+          </a:xfrm>
+          <a:prstGeom prst="rect">
+            <a:avLst/>
+          </a:prstGeom>
+          <a:ln w="38100" cap="sq">
+            <a:solidFill>
+              <a:srgbClr val="000000"/>
+            </a:solidFill>
+            <a:prstDash val="solid"/>
+            <a:miter lim="800000"/>
+          </a:ln>
+          <a:effectLst>
+            <a:outerShdw blurRad="50800" dist="38100" dir="2700000" algn="tl" rotWithShape="0">
+              <a:srgbClr val="000000">
+                <a:alpha val="43000"/>
+              </a:srgbClr>
+            </a:outerShdw>
+          </a:effectLst>
+        </p:spPr>
+      </p:pic>
     </p:spTree>
     <p:extLst>
       <p:ext uri="{BB962C8B-B14F-4D97-AF65-F5344CB8AC3E}">

</xml_diff>

<commit_message>
LightPictures added in presentation
</commit_message>
<xml_diff>
--- a/Documentation/nightlight Presentation - base.pptx
+++ b/Documentation/nightlight Presentation - base.pptx
@@ -11,8 +11,9 @@
     <p:sldId id="259" r:id="rId5"/>
     <p:sldId id="260" r:id="rId6"/>
     <p:sldId id="261" r:id="rId7"/>
-    <p:sldId id="262" r:id="rId8"/>
-    <p:sldId id="263" r:id="rId9"/>
+    <p:sldId id="264" r:id="rId8"/>
+    <p:sldId id="262" r:id="rId9"/>
+    <p:sldId id="263" r:id="rId10"/>
   </p:sldIdLst>
   <p:sldSz cx="12192000" cy="6858000"/>
   <p:notesSz cx="6858000" cy="9144000"/>
@@ -3912,31 +3913,63 @@
           </a:p>
         </p:txBody>
       </p:sp>
-      <p:sp>
-        <p:nvSpPr>
-          <p:cNvPr id="3" name="Platshållare för innehåll 2"/>
-          <p:cNvSpPr>
-            <a:spLocks noGrp="1"/>
-          </p:cNvSpPr>
+      <p:pic>
+        <p:nvPicPr>
+          <p:cNvPr id="5" name="Platshållare för innehåll 4"/>
+          <p:cNvPicPr>
+            <a:picLocks noGrp="1" noChangeAspect="1"/>
+          </p:cNvPicPr>
           <p:nvPr>
             <p:ph idx="1"/>
           </p:nvPr>
-        </p:nvSpPr>
-        <p:spPr/>
-        <p:txBody>
-          <a:bodyPr/>
-          <a:lstStyle/>
-          <a:p>
-            <a:endParaRPr lang="sv-SE" dirty="0">
-              <a:solidFill>
-                <a:schemeClr val="bg1">
-                  <a:lumMod val="65000"/>
-                </a:schemeClr>
-              </a:solidFill>
-            </a:endParaRPr>
-          </a:p>
-        </p:txBody>
-      </p:sp>
+        </p:nvPicPr>
+        <p:blipFill rotWithShape="1">
+          <a:blip r:embed="rId3">
+            <a:extLst>
+              <a:ext uri="{28A0092B-C50C-407E-A947-70E740481C1C}">
+                <a14:useLocalDpi xmlns:a14="http://schemas.microsoft.com/office/drawing/2010/main" val="0"/>
+              </a:ext>
+            </a:extLst>
+          </a:blip>
+          <a:srcRect l="31200" t="350" r="31124" b="48618"/>
+          <a:stretch/>
+        </p:blipFill>
+        <p:spPr>
+          <a:xfrm>
+            <a:off x="6332220" y="1967288"/>
+            <a:ext cx="4305300" cy="3640138"/>
+          </a:xfrm>
+        </p:spPr>
+      </p:pic>
+      <p:pic>
+        <p:nvPicPr>
+          <p:cNvPr id="6" name="Bildobjekt 5"/>
+          <p:cNvPicPr>
+            <a:picLocks noChangeAspect="1"/>
+          </p:cNvPicPr>
+          <p:nvPr/>
+        </p:nvPicPr>
+        <p:blipFill rotWithShape="1">
+          <a:blip r:embed="rId4">
+            <a:extLst>
+              <a:ext uri="{28A0092B-C50C-407E-A947-70E740481C1C}">
+                <a14:useLocalDpi xmlns:a14="http://schemas.microsoft.com/office/drawing/2010/main" val="0"/>
+              </a:ext>
+            </a:extLst>
+          </a:blip>
+          <a:srcRect l="31059" r="31142" b="46921"/>
+          <a:stretch/>
+        </p:blipFill>
+        <p:spPr>
+          <a:xfrm>
+            <a:off x="1897380" y="1967288"/>
+            <a:ext cx="4152900" cy="3640138"/>
+          </a:xfrm>
+          <a:prstGeom prst="rect">
+            <a:avLst/>
+          </a:prstGeom>
+        </p:spPr>
+      </p:pic>
     </p:spTree>
     <p:extLst>
       <p:ext uri="{BB962C8B-B14F-4D97-AF65-F5344CB8AC3E}">
@@ -4020,6 +4053,127 @@
           <a:lstStyle/>
           <a:p>
             <a:r>
+              <a:rPr lang="sv-SE" dirty="0" smtClean="0">
+                <a:solidFill>
+                  <a:schemeClr val="bg1">
+                    <a:lumMod val="65000"/>
+                  </a:schemeClr>
+                </a:solidFill>
+              </a:rPr>
+              <a:t>Ljus</a:t>
+            </a:r>
+            <a:endParaRPr lang="sv-SE" dirty="0">
+              <a:solidFill>
+                <a:schemeClr val="bg1">
+                  <a:lumMod val="65000"/>
+                </a:schemeClr>
+              </a:solidFill>
+            </a:endParaRPr>
+          </a:p>
+        </p:txBody>
+      </p:sp>
+      <p:sp>
+        <p:nvSpPr>
+          <p:cNvPr id="3" name="Platshållare för innehåll 2"/>
+          <p:cNvSpPr>
+            <a:spLocks noGrp="1"/>
+          </p:cNvSpPr>
+          <p:nvPr>
+            <p:ph idx="1"/>
+          </p:nvPr>
+        </p:nvSpPr>
+        <p:spPr/>
+        <p:txBody>
+          <a:bodyPr/>
+          <a:lstStyle/>
+          <a:p>
+            <a:endParaRPr lang="sv-SE"/>
+          </a:p>
+        </p:txBody>
+      </p:sp>
+    </p:spTree>
+    <p:extLst>
+      <p:ext uri="{BB962C8B-B14F-4D97-AF65-F5344CB8AC3E}">
+        <p14:creationId xmlns:p14="http://schemas.microsoft.com/office/powerpoint/2010/main" val="2268114453"/>
+      </p:ext>
+    </p:extLst>
+  </p:cSld>
+  <p:clrMapOvr>
+    <a:masterClrMapping/>
+  </p:clrMapOvr>
+  <p:timing>
+    <p:tnLst>
+      <p:par>
+        <p:cTn id="1" dur="indefinite" restart="never" nodeType="tmRoot"/>
+      </p:par>
+    </p:tnLst>
+  </p:timing>
+</p:sld>
+</file>
+
+<file path=ppt/slides/slide8.xml><?xml version="1.0" encoding="utf-8"?>
+<p:sld xmlns:a="http://schemas.openxmlformats.org/drawingml/2006/main" xmlns:r="http://schemas.openxmlformats.org/officeDocument/2006/relationships" xmlns:p="http://schemas.openxmlformats.org/presentationml/2006/main">
+  <p:cSld>
+    <p:spTree>
+      <p:nvGrpSpPr>
+        <p:cNvPr id="1" name=""/>
+        <p:cNvGrpSpPr/>
+        <p:nvPr/>
+      </p:nvGrpSpPr>
+      <p:grpSpPr>
+        <a:xfrm>
+          <a:off x="0" y="0"/>
+          <a:ext cx="0" cy="0"/>
+          <a:chOff x="0" y="0"/>
+          <a:chExt cx="0" cy="0"/>
+        </a:xfrm>
+      </p:grpSpPr>
+      <p:pic>
+        <p:nvPicPr>
+          <p:cNvPr id="4" name="Platshållare för innehåll 3"/>
+          <p:cNvPicPr>
+            <a:picLocks noChangeAspect="1"/>
+          </p:cNvPicPr>
+          <p:nvPr/>
+        </p:nvPicPr>
+        <p:blipFill>
+          <a:blip r:embed="rId2">
+            <a:extLst>
+              <a:ext uri="{28A0092B-C50C-407E-A947-70E740481C1C}">
+                <a14:useLocalDpi xmlns:a14="http://schemas.microsoft.com/office/drawing/2010/main" val="0"/>
+              </a:ext>
+            </a:extLst>
+          </a:blip>
+          <a:stretch>
+            <a:fillRect/>
+          </a:stretch>
+        </p:blipFill>
+        <p:spPr>
+          <a:xfrm>
+            <a:off x="0" y="-678872"/>
+            <a:ext cx="12211520" cy="7675418"/>
+          </a:xfrm>
+          <a:prstGeom prst="rect">
+            <a:avLst/>
+          </a:prstGeom>
+        </p:spPr>
+      </p:pic>
+      <p:sp>
+        <p:nvSpPr>
+          <p:cNvPr id="2" name="Rubrik 1"/>
+          <p:cNvSpPr>
+            <a:spLocks noGrp="1"/>
+          </p:cNvSpPr>
+          <p:nvPr>
+            <p:ph type="title"/>
+          </p:nvPr>
+        </p:nvSpPr>
+        <p:spPr/>
+        <p:txBody>
+          <a:bodyPr/>
+          <a:lstStyle/>
+          <a:p>
+            <a:r>
               <a:rPr lang="sv-SE" dirty="0" err="1" smtClean="0">
                 <a:solidFill>
                   <a:schemeClr val="bg1">
@@ -4084,7 +4238,7 @@
 </p:sld>
 </file>
 
-<file path=ppt/slides/slide8.xml><?xml version="1.0" encoding="utf-8"?>
+<file path=ppt/slides/slide9.xml><?xml version="1.0" encoding="utf-8"?>
 <p:sld xmlns:a="http://schemas.openxmlformats.org/drawingml/2006/main" xmlns:r="http://schemas.openxmlformats.org/officeDocument/2006/relationships" xmlns:p="http://schemas.openxmlformats.org/presentationml/2006/main">
   <p:cSld>
     <p:spTree>

</xml_diff>

<commit_message>
Jesper Powerpoint done? Nto sure with Grafik och design sliden
</commit_message>
<xml_diff>
--- a/Documentation/nightlight Presentation - base.pptx
+++ b/Documentation/nightlight Presentation - base.pptx
@@ -8,12 +8,13 @@
     <p:sldId id="256" r:id="rId2"/>
     <p:sldId id="257" r:id="rId3"/>
     <p:sldId id="258" r:id="rId4"/>
-    <p:sldId id="259" r:id="rId5"/>
-    <p:sldId id="260" r:id="rId6"/>
-    <p:sldId id="261" r:id="rId7"/>
-    <p:sldId id="264" r:id="rId8"/>
-    <p:sldId id="262" r:id="rId9"/>
-    <p:sldId id="263" r:id="rId10"/>
+    <p:sldId id="265" r:id="rId5"/>
+    <p:sldId id="259" r:id="rId6"/>
+    <p:sldId id="260" r:id="rId7"/>
+    <p:sldId id="261" r:id="rId8"/>
+    <p:sldId id="264" r:id="rId9"/>
+    <p:sldId id="262" r:id="rId10"/>
+    <p:sldId id="263" r:id="rId11"/>
   </p:sldIdLst>
   <p:sldSz cx="12192000" cy="6858000"/>
   <p:notesSz cx="6858000" cy="9144000"/>
@@ -3180,108 +3181,7 @@
 </p:sld>
 </file>
 
-<file path=ppt/slides/slide2.xml><?xml version="1.0" encoding="utf-8"?>
-<p:sld xmlns:a="http://schemas.openxmlformats.org/drawingml/2006/main" xmlns:r="http://schemas.openxmlformats.org/officeDocument/2006/relationships" xmlns:p="http://schemas.openxmlformats.org/presentationml/2006/main">
-  <p:cSld>
-    <p:spTree>
-      <p:nvGrpSpPr>
-        <p:cNvPr id="1" name=""/>
-        <p:cNvGrpSpPr/>
-        <p:nvPr/>
-      </p:nvGrpSpPr>
-      <p:grpSpPr>
-        <a:xfrm>
-          <a:off x="0" y="0"/>
-          <a:ext cx="0" cy="0"/>
-          <a:chOff x="0" y="0"/>
-          <a:chExt cx="0" cy="0"/>
-        </a:xfrm>
-      </p:grpSpPr>
-      <p:pic>
-        <p:nvPicPr>
-          <p:cNvPr id="4" name="Platshållare för innehåll 3"/>
-          <p:cNvPicPr>
-            <a:picLocks noGrp="1" noChangeAspect="1"/>
-          </p:cNvPicPr>
-          <p:nvPr>
-            <p:ph idx="1"/>
-          </p:nvPr>
-        </p:nvPicPr>
-        <p:blipFill>
-          <a:blip r:embed="rId2">
-            <a:extLst>
-              <a:ext uri="{28A0092B-C50C-407E-A947-70E740481C1C}">
-                <a14:useLocalDpi xmlns:a14="http://schemas.microsoft.com/office/drawing/2010/main" val="0"/>
-              </a:ext>
-            </a:extLst>
-          </a:blip>
-          <a:stretch>
-            <a:fillRect/>
-          </a:stretch>
-        </p:blipFill>
-        <p:spPr>
-          <a:xfrm>
-            <a:off x="0" y="-678872"/>
-            <a:ext cx="12211520" cy="7675418"/>
-          </a:xfrm>
-        </p:spPr>
-      </p:pic>
-      <p:sp>
-        <p:nvSpPr>
-          <p:cNvPr id="2" name="Rubrik 1"/>
-          <p:cNvSpPr>
-            <a:spLocks noGrp="1"/>
-          </p:cNvSpPr>
-          <p:nvPr>
-            <p:ph type="title"/>
-          </p:nvPr>
-        </p:nvSpPr>
-        <p:spPr/>
-        <p:txBody>
-          <a:bodyPr/>
-          <a:lstStyle/>
-          <a:p>
-            <a:r>
-              <a:rPr lang="sv-SE" dirty="0" smtClean="0">
-                <a:solidFill>
-                  <a:schemeClr val="bg1">
-                    <a:lumMod val="65000"/>
-                  </a:schemeClr>
-                </a:solidFill>
-              </a:rPr>
-              <a:t>Filmklipp</a:t>
-            </a:r>
-            <a:endParaRPr lang="sv-SE" dirty="0">
-              <a:solidFill>
-                <a:schemeClr val="bg1">
-                  <a:lumMod val="65000"/>
-                </a:schemeClr>
-              </a:solidFill>
-            </a:endParaRPr>
-          </a:p>
-        </p:txBody>
-      </p:sp>
-    </p:spTree>
-    <p:extLst>
-      <p:ext uri="{BB962C8B-B14F-4D97-AF65-F5344CB8AC3E}">
-        <p14:creationId xmlns:p14="http://schemas.microsoft.com/office/powerpoint/2010/main" val="3003330683"/>
-      </p:ext>
-    </p:extLst>
-  </p:cSld>
-  <p:clrMapOvr>
-    <a:masterClrMapping/>
-  </p:clrMapOvr>
-  <p:timing>
-    <p:tnLst>
-      <p:par>
-        <p:cTn id="1" dur="indefinite" restart="never" nodeType="tmRoot"/>
-      </p:par>
-    </p:tnLst>
-  </p:timing>
-</p:sld>
-</file>
-
-<file path=ppt/slides/slide3.xml><?xml version="1.0" encoding="utf-8"?>
+<file path=ppt/slides/slide10.xml><?xml version="1.0" encoding="utf-8"?>
 <p:sld xmlns:a="http://schemas.openxmlformats.org/drawingml/2006/main" xmlns:r="http://schemas.openxmlformats.org/officeDocument/2006/relationships" xmlns:p="http://schemas.openxmlformats.org/presentationml/2006/main">
   <p:cSld>
     <p:spTree>
@@ -3351,7 +3251,7 @@
                   </a:schemeClr>
                 </a:solidFill>
               </a:rPr>
-              <a:t>Grafik</a:t>
+              <a:t>AI</a:t>
             </a:r>
             <a:endParaRPr lang="sv-SE" dirty="0">
               <a:solidFill>
@@ -3388,6 +3288,643 @@
           </a:p>
         </p:txBody>
       </p:sp>
+    </p:spTree>
+    <p:extLst>
+      <p:ext uri="{BB962C8B-B14F-4D97-AF65-F5344CB8AC3E}">
+        <p14:creationId xmlns:p14="http://schemas.microsoft.com/office/powerpoint/2010/main" val="1919556467"/>
+      </p:ext>
+    </p:extLst>
+  </p:cSld>
+  <p:clrMapOvr>
+    <a:masterClrMapping/>
+  </p:clrMapOvr>
+</p:sld>
+</file>
+
+<file path=ppt/slides/slide2.xml><?xml version="1.0" encoding="utf-8"?>
+<p:sld xmlns:a="http://schemas.openxmlformats.org/drawingml/2006/main" xmlns:r="http://schemas.openxmlformats.org/officeDocument/2006/relationships" xmlns:p="http://schemas.openxmlformats.org/presentationml/2006/main">
+  <p:cSld>
+    <p:spTree>
+      <p:nvGrpSpPr>
+        <p:cNvPr id="1" name=""/>
+        <p:cNvGrpSpPr/>
+        <p:nvPr/>
+      </p:nvGrpSpPr>
+      <p:grpSpPr>
+        <a:xfrm>
+          <a:off x="0" y="0"/>
+          <a:ext cx="0" cy="0"/>
+          <a:chOff x="0" y="0"/>
+          <a:chExt cx="0" cy="0"/>
+        </a:xfrm>
+      </p:grpSpPr>
+      <p:pic>
+        <p:nvPicPr>
+          <p:cNvPr id="4" name="Platshållare för innehåll 3"/>
+          <p:cNvPicPr>
+            <a:picLocks noGrp="1" noChangeAspect="1"/>
+          </p:cNvPicPr>
+          <p:nvPr>
+            <p:ph idx="1"/>
+          </p:nvPr>
+        </p:nvPicPr>
+        <p:blipFill>
+          <a:blip r:embed="rId2">
+            <a:extLst>
+              <a:ext uri="{28A0092B-C50C-407E-A947-70E740481C1C}">
+                <a14:useLocalDpi xmlns:a14="http://schemas.microsoft.com/office/drawing/2010/main" val="0"/>
+              </a:ext>
+            </a:extLst>
+          </a:blip>
+          <a:stretch>
+            <a:fillRect/>
+          </a:stretch>
+        </p:blipFill>
+        <p:spPr>
+          <a:xfrm>
+            <a:off x="0" y="-678872"/>
+            <a:ext cx="12211520" cy="7675418"/>
+          </a:xfrm>
+        </p:spPr>
+      </p:pic>
+      <p:sp>
+        <p:nvSpPr>
+          <p:cNvPr id="2" name="Rubrik 1"/>
+          <p:cNvSpPr>
+            <a:spLocks noGrp="1"/>
+          </p:cNvSpPr>
+          <p:nvPr>
+            <p:ph type="title"/>
+          </p:nvPr>
+        </p:nvSpPr>
+        <p:spPr/>
+        <p:txBody>
+          <a:bodyPr/>
+          <a:lstStyle/>
+          <a:p>
+            <a:r>
+              <a:rPr lang="sv-SE" dirty="0" smtClean="0">
+                <a:solidFill>
+                  <a:schemeClr val="bg1">
+                    <a:lumMod val="65000"/>
+                  </a:schemeClr>
+                </a:solidFill>
+              </a:rPr>
+              <a:t>Filmklipp</a:t>
+            </a:r>
+            <a:endParaRPr lang="sv-SE" dirty="0">
+              <a:solidFill>
+                <a:schemeClr val="bg1">
+                  <a:lumMod val="65000"/>
+                </a:schemeClr>
+              </a:solidFill>
+            </a:endParaRPr>
+          </a:p>
+        </p:txBody>
+      </p:sp>
+    </p:spTree>
+    <p:extLst>
+      <p:ext uri="{BB962C8B-B14F-4D97-AF65-F5344CB8AC3E}">
+        <p14:creationId xmlns:p14="http://schemas.microsoft.com/office/powerpoint/2010/main" val="3003330683"/>
+      </p:ext>
+    </p:extLst>
+  </p:cSld>
+  <p:clrMapOvr>
+    <a:masterClrMapping/>
+  </p:clrMapOvr>
+  <p:timing>
+    <p:tnLst>
+      <p:par>
+        <p:cTn id="1" dur="indefinite" restart="never" nodeType="tmRoot"/>
+      </p:par>
+    </p:tnLst>
+  </p:timing>
+</p:sld>
+</file>
+
+<file path=ppt/slides/slide3.xml><?xml version="1.0" encoding="utf-8"?>
+<p:sld xmlns:a="http://schemas.openxmlformats.org/drawingml/2006/main" xmlns:r="http://schemas.openxmlformats.org/officeDocument/2006/relationships" xmlns:p="http://schemas.openxmlformats.org/presentationml/2006/main">
+  <p:cSld>
+    <p:spTree>
+      <p:nvGrpSpPr>
+        <p:cNvPr id="1" name=""/>
+        <p:cNvGrpSpPr/>
+        <p:nvPr/>
+      </p:nvGrpSpPr>
+      <p:grpSpPr>
+        <a:xfrm>
+          <a:off x="0" y="0"/>
+          <a:ext cx="0" cy="0"/>
+          <a:chOff x="0" y="0"/>
+          <a:chExt cx="0" cy="0"/>
+        </a:xfrm>
+      </p:grpSpPr>
+      <p:pic>
+        <p:nvPicPr>
+          <p:cNvPr id="15" name="Platshållare för innehåll 3"/>
+          <p:cNvPicPr>
+            <a:picLocks noChangeAspect="1"/>
+          </p:cNvPicPr>
+          <p:nvPr/>
+        </p:nvPicPr>
+        <p:blipFill>
+          <a:blip r:embed="rId2">
+            <a:extLst>
+              <a:ext uri="{28A0092B-C50C-407E-A947-70E740481C1C}">
+                <a14:useLocalDpi xmlns:a14="http://schemas.microsoft.com/office/drawing/2010/main" val="0"/>
+              </a:ext>
+            </a:extLst>
+          </a:blip>
+          <a:stretch>
+            <a:fillRect/>
+          </a:stretch>
+        </p:blipFill>
+        <p:spPr>
+          <a:xfrm>
+            <a:off x="0" y="-678872"/>
+            <a:ext cx="12211520" cy="7675418"/>
+          </a:xfrm>
+          <a:prstGeom prst="rect">
+            <a:avLst/>
+          </a:prstGeom>
+        </p:spPr>
+      </p:pic>
+      <p:sp>
+        <p:nvSpPr>
+          <p:cNvPr id="2" name="Rubrik 1"/>
+          <p:cNvSpPr>
+            <a:spLocks noGrp="1"/>
+          </p:cNvSpPr>
+          <p:nvPr>
+            <p:ph type="title"/>
+          </p:nvPr>
+        </p:nvSpPr>
+        <p:spPr/>
+        <p:txBody>
+          <a:bodyPr/>
+          <a:lstStyle/>
+          <a:p>
+            <a:r>
+              <a:rPr lang="sv-SE" dirty="0" smtClean="0">
+                <a:solidFill>
+                  <a:schemeClr val="bg1">
+                    <a:lumMod val="65000"/>
+                  </a:schemeClr>
+                </a:solidFill>
+                <a:effectLst>
+                  <a:outerShdw blurRad="38100" dist="38100" dir="2700000" algn="tl">
+                    <a:srgbClr val="000000">
+                      <a:alpha val="43137"/>
+                    </a:srgbClr>
+                  </a:outerShdw>
+                </a:effectLst>
+                <a:latin typeface="Eras Light ITC" panose="020B0402030504020804" pitchFamily="34" charset="0"/>
+              </a:rPr>
+              <a:t>Grafik och design</a:t>
+            </a:r>
+            <a:endParaRPr lang="sv-SE" dirty="0">
+              <a:solidFill>
+                <a:schemeClr val="bg1">
+                  <a:lumMod val="65000"/>
+                </a:schemeClr>
+              </a:solidFill>
+              <a:effectLst>
+                <a:outerShdw blurRad="38100" dist="38100" dir="2700000" algn="tl">
+                  <a:srgbClr val="000000">
+                    <a:alpha val="43137"/>
+                  </a:srgbClr>
+                </a:outerShdw>
+              </a:effectLst>
+              <a:latin typeface="Eras Light ITC" panose="020B0402030504020804" pitchFamily="34" charset="0"/>
+            </a:endParaRPr>
+          </a:p>
+        </p:txBody>
+      </p:sp>
+      <p:pic>
+        <p:nvPicPr>
+          <p:cNvPr id="17" name="Picture 16"/>
+          <p:cNvPicPr>
+            <a:picLocks noChangeAspect="1"/>
+          </p:cNvPicPr>
+          <p:nvPr/>
+        </p:nvPicPr>
+        <p:blipFill>
+          <a:blip r:embed="rId3" cstate="print">
+            <a:extLst>
+              <a:ext uri="{28A0092B-C50C-407E-A947-70E740481C1C}">
+                <a14:useLocalDpi xmlns:a14="http://schemas.microsoft.com/office/drawing/2010/main" val="0"/>
+              </a:ext>
+            </a:extLst>
+          </a:blip>
+          <a:stretch>
+            <a:fillRect/>
+          </a:stretch>
+        </p:blipFill>
+        <p:spPr>
+          <a:xfrm>
+            <a:off x="838199" y="1347767"/>
+            <a:ext cx="3222787" cy="1854796"/>
+          </a:xfrm>
+          <a:prstGeom prst="rect">
+            <a:avLst/>
+          </a:prstGeom>
+          <a:solidFill>
+            <a:srgbClr val="FFFFFF">
+              <a:shade val="85000"/>
+            </a:srgbClr>
+          </a:solidFill>
+          <a:ln w="9525" cap="sq">
+            <a:solidFill>
+              <a:schemeClr val="tx1"/>
+            </a:solidFill>
+            <a:miter lim="800000"/>
+          </a:ln>
+          <a:effectLst>
+            <a:outerShdw blurRad="55000" dist="18000" dir="5400000" algn="tl" rotWithShape="0">
+              <a:srgbClr val="000000">
+                <a:alpha val="40000"/>
+              </a:srgbClr>
+            </a:outerShdw>
+          </a:effectLst>
+          <a:scene3d>
+            <a:camera prst="orthographicFront"/>
+            <a:lightRig rig="twoPt" dir="t">
+              <a:rot lat="0" lon="0" rev="7200000"/>
+            </a:lightRig>
+          </a:scene3d>
+          <a:sp3d>
+            <a:bevelT w="25400" h="19050"/>
+            <a:contourClr>
+              <a:srgbClr val="FFFFFF"/>
+            </a:contourClr>
+          </a:sp3d>
+        </p:spPr>
+      </p:pic>
+      <p:pic>
+        <p:nvPicPr>
+          <p:cNvPr id="5" name="Picture 4"/>
+          <p:cNvPicPr>
+            <a:picLocks noChangeAspect="1"/>
+          </p:cNvPicPr>
+          <p:nvPr/>
+        </p:nvPicPr>
+        <p:blipFill>
+          <a:blip r:embed="rId4" cstate="print">
+            <a:extLst>
+              <a:ext uri="{28A0092B-C50C-407E-A947-70E740481C1C}">
+                <a14:useLocalDpi xmlns:a14="http://schemas.microsoft.com/office/drawing/2010/main" val="0"/>
+              </a:ext>
+            </a:extLst>
+          </a:blip>
+          <a:stretch>
+            <a:fillRect/>
+          </a:stretch>
+        </p:blipFill>
+        <p:spPr>
+          <a:xfrm>
+            <a:off x="-492032" y="1347767"/>
+            <a:ext cx="3681743" cy="2070980"/>
+          </a:xfrm>
+          <a:prstGeom prst="rect">
+            <a:avLst/>
+          </a:prstGeom>
+        </p:spPr>
+      </p:pic>
+      <p:pic>
+        <p:nvPicPr>
+          <p:cNvPr id="6" name="Picture 5"/>
+          <p:cNvPicPr>
+            <a:picLocks noChangeAspect="1"/>
+          </p:cNvPicPr>
+          <p:nvPr/>
+        </p:nvPicPr>
+        <p:blipFill>
+          <a:blip r:embed="rId5" cstate="print">
+            <a:extLst>
+              <a:ext uri="{28A0092B-C50C-407E-A947-70E740481C1C}">
+                <a14:useLocalDpi xmlns:a14="http://schemas.microsoft.com/office/drawing/2010/main" val="0"/>
+              </a:ext>
+            </a:extLst>
+          </a:blip>
+          <a:stretch>
+            <a:fillRect/>
+          </a:stretch>
+        </p:blipFill>
+        <p:spPr>
+          <a:xfrm>
+            <a:off x="34057" y="1078427"/>
+            <a:ext cx="4657464" cy="2619824"/>
+          </a:xfrm>
+          <a:prstGeom prst="rect">
+            <a:avLst/>
+          </a:prstGeom>
+        </p:spPr>
+      </p:pic>
+      <p:pic>
+        <p:nvPicPr>
+          <p:cNvPr id="21" name="Picture 20"/>
+          <p:cNvPicPr>
+            <a:picLocks noChangeAspect="1"/>
+          </p:cNvPicPr>
+          <p:nvPr/>
+        </p:nvPicPr>
+        <p:blipFill>
+          <a:blip r:embed="rId6" cstate="print">
+            <a:extLst>
+              <a:ext uri="{28A0092B-C50C-407E-A947-70E740481C1C}">
+                <a14:useLocalDpi xmlns:a14="http://schemas.microsoft.com/office/drawing/2010/main" val="0"/>
+              </a:ext>
+            </a:extLst>
+          </a:blip>
+          <a:stretch>
+            <a:fillRect/>
+          </a:stretch>
+        </p:blipFill>
+        <p:spPr>
+          <a:xfrm>
+            <a:off x="822707" y="3749924"/>
+            <a:ext cx="3459650" cy="2195742"/>
+          </a:xfrm>
+          <a:prstGeom prst="rect">
+            <a:avLst/>
+          </a:prstGeom>
+          <a:solidFill>
+            <a:srgbClr val="FFFFFF">
+              <a:shade val="85000"/>
+            </a:srgbClr>
+          </a:solidFill>
+          <a:ln w="9525" cap="sq">
+            <a:solidFill>
+              <a:schemeClr val="tx1"/>
+            </a:solidFill>
+            <a:miter lim="800000"/>
+          </a:ln>
+          <a:effectLst>
+            <a:outerShdw blurRad="55000" dist="18000" dir="5400000" algn="tl" rotWithShape="0">
+              <a:srgbClr val="000000">
+                <a:alpha val="40000"/>
+              </a:srgbClr>
+            </a:outerShdw>
+          </a:effectLst>
+          <a:scene3d>
+            <a:camera prst="orthographicFront"/>
+            <a:lightRig rig="twoPt" dir="t">
+              <a:rot lat="0" lon="0" rev="7200000"/>
+            </a:lightRig>
+          </a:scene3d>
+          <a:sp3d>
+            <a:bevelT w="25400" h="19050"/>
+            <a:contourClr>
+              <a:srgbClr val="FFFFFF"/>
+            </a:contourClr>
+          </a:sp3d>
+        </p:spPr>
+      </p:pic>
+      <p:pic>
+        <p:nvPicPr>
+          <p:cNvPr id="7" name="Picture 6"/>
+          <p:cNvPicPr>
+            <a:picLocks noChangeAspect="1"/>
+          </p:cNvPicPr>
+          <p:nvPr/>
+        </p:nvPicPr>
+        <p:blipFill>
+          <a:blip r:embed="rId7" cstate="print">
+            <a:extLst>
+              <a:ext uri="{28A0092B-C50C-407E-A947-70E740481C1C}">
+                <a14:useLocalDpi xmlns:a14="http://schemas.microsoft.com/office/drawing/2010/main" val="0"/>
+              </a:ext>
+            </a:extLst>
+          </a:blip>
+          <a:stretch>
+            <a:fillRect/>
+          </a:stretch>
+        </p:blipFill>
+        <p:spPr>
+          <a:xfrm>
+            <a:off x="1241107" y="1065199"/>
+            <a:ext cx="4362134" cy="2453701"/>
+          </a:xfrm>
+          <a:prstGeom prst="rect">
+            <a:avLst/>
+          </a:prstGeom>
+        </p:spPr>
+      </p:pic>
+      <p:pic>
+        <p:nvPicPr>
+          <p:cNvPr id="8" name="Picture 7"/>
+          <p:cNvPicPr>
+            <a:picLocks noChangeAspect="1"/>
+          </p:cNvPicPr>
+          <p:nvPr/>
+        </p:nvPicPr>
+        <p:blipFill>
+          <a:blip r:embed="rId8" cstate="print">
+            <a:extLst>
+              <a:ext uri="{28A0092B-C50C-407E-A947-70E740481C1C}">
+                <a14:useLocalDpi xmlns:a14="http://schemas.microsoft.com/office/drawing/2010/main" val="0"/>
+              </a:ext>
+            </a:extLst>
+          </a:blip>
+          <a:stretch>
+            <a:fillRect/>
+          </a:stretch>
+        </p:blipFill>
+        <p:spPr>
+          <a:xfrm>
+            <a:off x="748664" y="3505050"/>
+            <a:ext cx="2086541" cy="2315996"/>
+          </a:xfrm>
+          <a:prstGeom prst="rect">
+            <a:avLst/>
+          </a:prstGeom>
+        </p:spPr>
+      </p:pic>
+      <p:pic>
+        <p:nvPicPr>
+          <p:cNvPr id="9" name="Picture 8"/>
+          <p:cNvPicPr>
+            <a:picLocks noChangeAspect="1"/>
+          </p:cNvPicPr>
+          <p:nvPr/>
+        </p:nvPicPr>
+        <p:blipFill>
+          <a:blip r:embed="rId9" cstate="print">
+            <a:extLst>
+              <a:ext uri="{28A0092B-C50C-407E-A947-70E740481C1C}">
+                <a14:useLocalDpi xmlns:a14="http://schemas.microsoft.com/office/drawing/2010/main" val="0"/>
+              </a:ext>
+            </a:extLst>
+          </a:blip>
+          <a:stretch>
+            <a:fillRect/>
+          </a:stretch>
+        </p:blipFill>
+        <p:spPr>
+          <a:xfrm>
+            <a:off x="1598641" y="3843255"/>
+            <a:ext cx="3917341" cy="2203504"/>
+          </a:xfrm>
+          <a:prstGeom prst="rect">
+            <a:avLst/>
+          </a:prstGeom>
+        </p:spPr>
+      </p:pic>
+      <p:pic>
+        <p:nvPicPr>
+          <p:cNvPr id="20" name="Picture 19"/>
+          <p:cNvPicPr>
+            <a:picLocks noChangeAspect="1"/>
+          </p:cNvPicPr>
+          <p:nvPr/>
+        </p:nvPicPr>
+        <p:blipFill>
+          <a:blip r:embed="rId10" cstate="print">
+            <a:extLst>
+              <a:ext uri="{28A0092B-C50C-407E-A947-70E740481C1C}">
+                <a14:useLocalDpi xmlns:a14="http://schemas.microsoft.com/office/drawing/2010/main" val="0"/>
+              </a:ext>
+            </a:extLst>
+          </a:blip>
+          <a:stretch>
+            <a:fillRect/>
+          </a:stretch>
+        </p:blipFill>
+        <p:spPr>
+          <a:xfrm>
+            <a:off x="5515982" y="1121635"/>
+            <a:ext cx="3042309" cy="2298927"/>
+          </a:xfrm>
+          <a:prstGeom prst="rect">
+            <a:avLst/>
+          </a:prstGeom>
+          <a:solidFill>
+            <a:srgbClr val="FFFFFF">
+              <a:shade val="85000"/>
+            </a:srgbClr>
+          </a:solidFill>
+          <a:ln w="9525" cap="sq">
+            <a:solidFill>
+              <a:schemeClr val="tx1"/>
+            </a:solidFill>
+            <a:miter lim="800000"/>
+          </a:ln>
+          <a:effectLst>
+            <a:outerShdw blurRad="55000" dist="18000" dir="5400000" algn="tl" rotWithShape="0">
+              <a:srgbClr val="000000">
+                <a:alpha val="40000"/>
+              </a:srgbClr>
+            </a:outerShdw>
+          </a:effectLst>
+          <a:scene3d>
+            <a:camera prst="orthographicFront"/>
+            <a:lightRig rig="twoPt" dir="t">
+              <a:rot lat="0" lon="0" rev="7200000"/>
+            </a:lightRig>
+          </a:scene3d>
+          <a:sp3d>
+            <a:bevelT w="25400" h="19050"/>
+            <a:contourClr>
+              <a:srgbClr val="FFFFFF"/>
+            </a:contourClr>
+          </a:sp3d>
+        </p:spPr>
+      </p:pic>
+      <p:pic>
+        <p:nvPicPr>
+          <p:cNvPr id="10" name="Picture 9"/>
+          <p:cNvPicPr>
+            <a:picLocks noChangeAspect="1"/>
+          </p:cNvPicPr>
+          <p:nvPr/>
+        </p:nvPicPr>
+        <p:blipFill>
+          <a:blip r:embed="rId11" cstate="print">
+            <a:extLst>
+              <a:ext uri="{28A0092B-C50C-407E-A947-70E740481C1C}">
+                <a14:useLocalDpi xmlns:a14="http://schemas.microsoft.com/office/drawing/2010/main" val="0"/>
+              </a:ext>
+            </a:extLst>
+          </a:blip>
+          <a:stretch>
+            <a:fillRect/>
+          </a:stretch>
+        </p:blipFill>
+        <p:spPr>
+          <a:xfrm>
+            <a:off x="3681743" y="1121635"/>
+            <a:ext cx="4876548" cy="2743058"/>
+          </a:xfrm>
+          <a:prstGeom prst="rect">
+            <a:avLst/>
+          </a:prstGeom>
+        </p:spPr>
+      </p:pic>
+      <p:pic>
+        <p:nvPicPr>
+          <p:cNvPr id="11" name="Picture 10"/>
+          <p:cNvPicPr>
+            <a:picLocks noChangeAspect="1"/>
+          </p:cNvPicPr>
+          <p:nvPr/>
+        </p:nvPicPr>
+        <p:blipFill>
+          <a:blip r:embed="rId12" cstate="print">
+            <a:extLst>
+              <a:ext uri="{28A0092B-C50C-407E-A947-70E740481C1C}">
+                <a14:useLocalDpi xmlns:a14="http://schemas.microsoft.com/office/drawing/2010/main" val="0"/>
+              </a:ext>
+            </a:extLst>
+          </a:blip>
+          <a:stretch>
+            <a:fillRect/>
+          </a:stretch>
+        </p:blipFill>
+        <p:spPr>
+          <a:xfrm>
+            <a:off x="5335164" y="1078634"/>
+            <a:ext cx="4744458" cy="2668758"/>
+          </a:xfrm>
+          <a:prstGeom prst="rect">
+            <a:avLst/>
+          </a:prstGeom>
+        </p:spPr>
+      </p:pic>
+      <p:pic>
+        <p:nvPicPr>
+          <p:cNvPr id="16" name="Picture 15"/>
+          <p:cNvPicPr>
+            <a:picLocks noChangeAspect="1"/>
+          </p:cNvPicPr>
+          <p:nvPr/>
+        </p:nvPicPr>
+        <p:blipFill>
+          <a:blip r:embed="rId13" cstate="print">
+            <a:extLst>
+              <a:ext uri="{28A0092B-C50C-407E-A947-70E740481C1C}">
+                <a14:useLocalDpi xmlns:a14="http://schemas.microsoft.com/office/drawing/2010/main" val="0"/>
+              </a:ext>
+            </a:extLst>
+          </a:blip>
+          <a:stretch>
+            <a:fillRect/>
+          </a:stretch>
+        </p:blipFill>
+        <p:spPr>
+          <a:xfrm>
+            <a:off x="5523209" y="3747392"/>
+            <a:ext cx="3589335" cy="2949018"/>
+          </a:xfrm>
+          <a:prstGeom prst="rect">
+            <a:avLst/>
+          </a:prstGeom>
+          <a:ln w="9525">
+            <a:solidFill>
+              <a:schemeClr val="bg1"/>
+            </a:solidFill>
+          </a:ln>
+        </p:spPr>
+      </p:pic>
     </p:spTree>
     <p:extLst>
       <p:ext uri="{BB962C8B-B14F-4D97-AF65-F5344CB8AC3E}">
@@ -3409,6 +3946,445 @@
 </file>
 
 <file path=ppt/slides/slide4.xml><?xml version="1.0" encoding="utf-8"?>
+<p:sld xmlns:a="http://schemas.openxmlformats.org/drawingml/2006/main" xmlns:r="http://schemas.openxmlformats.org/officeDocument/2006/relationships" xmlns:p="http://schemas.openxmlformats.org/presentationml/2006/main">
+  <p:cSld>
+    <p:spTree>
+      <p:nvGrpSpPr>
+        <p:cNvPr id="1" name=""/>
+        <p:cNvGrpSpPr/>
+        <p:nvPr/>
+      </p:nvGrpSpPr>
+      <p:grpSpPr>
+        <a:xfrm>
+          <a:off x="0" y="0"/>
+          <a:ext cx="0" cy="0"/>
+          <a:chOff x="0" y="0"/>
+          <a:chExt cx="0" cy="0"/>
+        </a:xfrm>
+      </p:grpSpPr>
+      <p:pic>
+        <p:nvPicPr>
+          <p:cNvPr id="6" name="Platshållare för innehåll 3"/>
+          <p:cNvPicPr>
+            <a:picLocks noChangeAspect="1"/>
+          </p:cNvPicPr>
+          <p:nvPr/>
+        </p:nvPicPr>
+        <p:blipFill>
+          <a:blip r:embed="rId2">
+            <a:extLst>
+              <a:ext uri="{28A0092B-C50C-407E-A947-70E740481C1C}">
+                <a14:useLocalDpi xmlns:a14="http://schemas.microsoft.com/office/drawing/2010/main" val="0"/>
+              </a:ext>
+            </a:extLst>
+          </a:blip>
+          <a:stretch>
+            <a:fillRect/>
+          </a:stretch>
+        </p:blipFill>
+        <p:spPr>
+          <a:xfrm>
+            <a:off x="0" y="-678872"/>
+            <a:ext cx="12211520" cy="7675418"/>
+          </a:xfrm>
+          <a:prstGeom prst="rect">
+            <a:avLst/>
+          </a:prstGeom>
+        </p:spPr>
+      </p:pic>
+      <p:sp>
+        <p:nvSpPr>
+          <p:cNvPr id="7" name="Title 6"/>
+          <p:cNvSpPr>
+            <a:spLocks noGrp="1"/>
+          </p:cNvSpPr>
+          <p:nvPr>
+            <p:ph type="title"/>
+          </p:nvPr>
+        </p:nvSpPr>
+        <p:spPr/>
+        <p:txBody>
+          <a:bodyPr/>
+          <a:lstStyle/>
+          <a:p>
+            <a:r>
+              <a:rPr lang="sv-SE" dirty="0" smtClean="0">
+                <a:solidFill>
+                  <a:schemeClr val="bg1">
+                    <a:lumMod val="65000"/>
+                  </a:schemeClr>
+                </a:solidFill>
+                <a:effectLst>
+                  <a:outerShdw blurRad="38100" dist="38100" dir="2700000" algn="tl">
+                    <a:srgbClr val="000000">
+                      <a:alpha val="43137"/>
+                    </a:srgbClr>
+                  </a:outerShdw>
+                </a:effectLst>
+                <a:latin typeface="Eras Light ITC" panose="020B0402030504020804" pitchFamily="34" charset="0"/>
+              </a:rPr>
+              <a:t>Meny design</a:t>
+            </a:r>
+            <a:endParaRPr lang="sv-SE" dirty="0"/>
+          </a:p>
+        </p:txBody>
+      </p:sp>
+      <p:pic>
+        <p:nvPicPr>
+          <p:cNvPr id="8" name="Picture 7"/>
+          <p:cNvPicPr>
+            <a:picLocks noChangeAspect="1"/>
+          </p:cNvPicPr>
+          <p:nvPr/>
+        </p:nvPicPr>
+        <p:blipFill>
+          <a:blip r:embed="rId3">
+            <a:extLst>
+              <a:ext uri="{28A0092B-C50C-407E-A947-70E740481C1C}">
+                <a14:useLocalDpi xmlns:a14="http://schemas.microsoft.com/office/drawing/2010/main" val="0"/>
+              </a:ext>
+            </a:extLst>
+          </a:blip>
+          <a:stretch>
+            <a:fillRect/>
+          </a:stretch>
+        </p:blipFill>
+        <p:spPr>
+          <a:xfrm>
+            <a:off x="4089400" y="894383"/>
+            <a:ext cx="6647113" cy="5619129"/>
+          </a:xfrm>
+          <a:prstGeom prst="rect">
+            <a:avLst/>
+          </a:prstGeom>
+          <a:ln>
+            <a:solidFill>
+              <a:schemeClr val="bg1"/>
+            </a:solidFill>
+          </a:ln>
+        </p:spPr>
+      </p:pic>
+      <p:sp>
+        <p:nvSpPr>
+          <p:cNvPr id="9" name="Rectangle 8"/>
+          <p:cNvSpPr/>
+          <p:nvPr/>
+        </p:nvSpPr>
+        <p:spPr>
+          <a:xfrm>
+            <a:off x="838200" y="1506022"/>
+            <a:ext cx="2820003" cy="3785652"/>
+          </a:xfrm>
+          <a:prstGeom prst="rect">
+            <a:avLst/>
+          </a:prstGeom>
+        </p:spPr>
+        <p:txBody>
+          <a:bodyPr wrap="none">
+            <a:spAutoFit/>
+          </a:bodyPr>
+          <a:lstStyle/>
+          <a:p>
+            <a:r>
+              <a:rPr lang="sv-SE" sz="2400" dirty="0" smtClean="0">
+                <a:solidFill>
+                  <a:schemeClr val="bg1">
+                    <a:lumMod val="65000"/>
+                  </a:schemeClr>
+                </a:solidFill>
+                <a:effectLst>
+                  <a:outerShdw blurRad="38100" dist="38100" dir="2700000" algn="tl">
+                    <a:srgbClr val="000000">
+                      <a:alpha val="43137"/>
+                    </a:srgbClr>
+                  </a:outerShdw>
+                </a:effectLst>
+                <a:latin typeface="Eras Light ITC" panose="020B0402030504020804" pitchFamily="34" charset="0"/>
+              </a:rPr>
+              <a:t>Fördelar:</a:t>
+            </a:r>
+          </a:p>
+          <a:p>
+            <a:r>
+              <a:rPr lang="sv-SE" sz="2400" dirty="0" smtClean="0">
+                <a:solidFill>
+                  <a:schemeClr val="bg1">
+                    <a:lumMod val="65000"/>
+                  </a:schemeClr>
+                </a:solidFill>
+                <a:effectLst>
+                  <a:outerShdw blurRad="38100" dist="38100" dir="2700000" algn="tl">
+                    <a:srgbClr val="000000">
+                      <a:alpha val="43137"/>
+                    </a:srgbClr>
+                  </a:outerShdw>
+                </a:effectLst>
+                <a:latin typeface="Eras Light ITC" panose="020B0402030504020804" pitchFamily="34" charset="0"/>
+              </a:rPr>
+              <a:t>-Test av kontroller</a:t>
+            </a:r>
+          </a:p>
+          <a:p>
+            <a:r>
+              <a:rPr lang="sv-SE" sz="2400" dirty="0" smtClean="0">
+                <a:solidFill>
+                  <a:schemeClr val="bg1">
+                    <a:lumMod val="65000"/>
+                  </a:schemeClr>
+                </a:solidFill>
+                <a:effectLst>
+                  <a:outerShdw blurRad="38100" dist="38100" dir="2700000" algn="tl">
+                    <a:srgbClr val="000000">
+                      <a:alpha val="43137"/>
+                    </a:srgbClr>
+                  </a:outerShdw>
+                </a:effectLst>
+                <a:latin typeface="Eras Light ITC" panose="020B0402030504020804" pitchFamily="34" charset="0"/>
+              </a:rPr>
+              <a:t>-Spelaren känner sig </a:t>
+            </a:r>
+          </a:p>
+          <a:p>
+            <a:r>
+              <a:rPr lang="sv-SE" sz="2400" dirty="0" smtClean="0">
+                <a:solidFill>
+                  <a:schemeClr val="bg1">
+                    <a:lumMod val="65000"/>
+                  </a:schemeClr>
+                </a:solidFill>
+                <a:effectLst>
+                  <a:outerShdw blurRad="38100" dist="38100" dir="2700000" algn="tl">
+                    <a:srgbClr val="000000">
+                      <a:alpha val="43137"/>
+                    </a:srgbClr>
+                  </a:outerShdw>
+                </a:effectLst>
+                <a:latin typeface="Eras Light ITC" panose="020B0402030504020804" pitchFamily="34" charset="0"/>
+              </a:rPr>
+              <a:t>som de alltid spelar</a:t>
+            </a:r>
+          </a:p>
+          <a:p>
+            <a:endParaRPr lang="sv-SE" sz="2400" dirty="0">
+              <a:solidFill>
+                <a:schemeClr val="bg1">
+                  <a:lumMod val="65000"/>
+                </a:schemeClr>
+              </a:solidFill>
+              <a:effectLst>
+                <a:outerShdw blurRad="38100" dist="38100" dir="2700000" algn="tl">
+                  <a:srgbClr val="000000">
+                    <a:alpha val="43137"/>
+                  </a:srgbClr>
+                </a:outerShdw>
+              </a:effectLst>
+              <a:latin typeface="Eras Light ITC" panose="020B0402030504020804" pitchFamily="34" charset="0"/>
+            </a:endParaRPr>
+          </a:p>
+          <a:p>
+            <a:r>
+              <a:rPr lang="sv-SE" sz="2400" dirty="0" smtClean="0">
+                <a:solidFill>
+                  <a:schemeClr val="bg1">
+                    <a:lumMod val="65000"/>
+                  </a:schemeClr>
+                </a:solidFill>
+                <a:effectLst>
+                  <a:outerShdw blurRad="38100" dist="38100" dir="2700000" algn="tl">
+                    <a:srgbClr val="000000">
+                      <a:alpha val="43137"/>
+                    </a:srgbClr>
+                  </a:outerShdw>
+                </a:effectLst>
+                <a:latin typeface="Eras Light ITC" panose="020B0402030504020804" pitchFamily="34" charset="0"/>
+              </a:rPr>
+              <a:t>Nackdelar:</a:t>
+            </a:r>
+          </a:p>
+          <a:p>
+            <a:r>
+              <a:rPr lang="sv-SE" sz="2400" dirty="0" smtClean="0">
+                <a:solidFill>
+                  <a:schemeClr val="bg1">
+                    <a:lumMod val="65000"/>
+                  </a:schemeClr>
+                </a:solidFill>
+                <a:effectLst>
+                  <a:outerShdw blurRad="38100" dist="38100" dir="2700000" algn="tl">
+                    <a:srgbClr val="000000">
+                      <a:alpha val="43137"/>
+                    </a:srgbClr>
+                  </a:outerShdw>
+                </a:effectLst>
+                <a:latin typeface="Eras Light ITC" panose="020B0402030504020804" pitchFamily="34" charset="0"/>
+              </a:rPr>
+              <a:t>-Inte lika snabb och </a:t>
+            </a:r>
+          </a:p>
+          <a:p>
+            <a:r>
+              <a:rPr lang="sv-SE" sz="2400" dirty="0" smtClean="0">
+                <a:solidFill>
+                  <a:schemeClr val="bg1">
+                    <a:lumMod val="65000"/>
+                  </a:schemeClr>
+                </a:solidFill>
+                <a:effectLst>
+                  <a:outerShdw blurRad="38100" dist="38100" dir="2700000" algn="tl">
+                    <a:srgbClr val="000000">
+                      <a:alpha val="43137"/>
+                    </a:srgbClr>
+                  </a:outerShdw>
+                </a:effectLst>
+                <a:latin typeface="Eras Light ITC" panose="020B0402030504020804" pitchFamily="34" charset="0"/>
+              </a:rPr>
+              <a:t>effektiv</a:t>
+            </a:r>
+          </a:p>
+          <a:p>
+            <a:r>
+              <a:rPr lang="sv-SE" sz="2400" dirty="0" smtClean="0">
+                <a:solidFill>
+                  <a:schemeClr val="bg1">
+                    <a:lumMod val="65000"/>
+                  </a:schemeClr>
+                </a:solidFill>
+                <a:effectLst>
+                  <a:outerShdw blurRad="38100" dist="38100" dir="2700000" algn="tl">
+                    <a:srgbClr val="000000">
+                      <a:alpha val="43137"/>
+                    </a:srgbClr>
+                  </a:outerShdw>
+                </a:effectLst>
+                <a:latin typeface="Eras Light ITC" panose="020B0402030504020804" pitchFamily="34" charset="0"/>
+              </a:rPr>
+              <a:t>-Är spelet verkligen </a:t>
+            </a:r>
+          </a:p>
+          <a:p>
+            <a:r>
+              <a:rPr lang="sv-SE" sz="2400" dirty="0" smtClean="0">
+                <a:solidFill>
+                  <a:schemeClr val="bg1">
+                    <a:lumMod val="65000"/>
+                  </a:schemeClr>
+                </a:solidFill>
+                <a:effectLst>
+                  <a:outerShdw blurRad="38100" dist="38100" dir="2700000" algn="tl">
+                    <a:srgbClr val="000000">
+                      <a:alpha val="43137"/>
+                    </a:srgbClr>
+                  </a:outerShdw>
+                </a:effectLst>
+                <a:latin typeface="Eras Light ITC" panose="020B0402030504020804" pitchFamily="34" charset="0"/>
+              </a:rPr>
+              <a:t>pausat?</a:t>
+            </a:r>
+            <a:endParaRPr lang="sv-SE" sz="2400" dirty="0">
+              <a:effectLst>
+                <a:outerShdw blurRad="38100" dist="38100" dir="2700000" algn="tl">
+                  <a:srgbClr val="000000">
+                    <a:alpha val="43137"/>
+                  </a:srgbClr>
+                </a:outerShdw>
+              </a:effectLst>
+              <a:latin typeface="Eras Light ITC" panose="020B0402030504020804" pitchFamily="34" charset="0"/>
+            </a:endParaRPr>
+          </a:p>
+        </p:txBody>
+      </p:sp>
+    </p:spTree>
+    <p:extLst>
+      <p:ext uri="{BB962C8B-B14F-4D97-AF65-F5344CB8AC3E}">
+        <p14:creationId xmlns:p14="http://schemas.microsoft.com/office/powerpoint/2010/main" val="3369929585"/>
+      </p:ext>
+    </p:extLst>
+  </p:cSld>
+  <p:clrMapOvr>
+    <a:masterClrMapping/>
+  </p:clrMapOvr>
+  <p:timing>
+    <p:tnLst>
+      <p:par>
+        <p:cTn id="1" dur="indefinite" restart="never" nodeType="tmRoot">
+          <p:childTnLst>
+            <p:seq concurrent="1" nextAc="seek">
+              <p:cTn id="2" dur="indefinite" nodeType="mainSeq">
+                <p:childTnLst>
+                  <p:par>
+                    <p:cTn id="3" fill="hold">
+                      <p:stCondLst>
+                        <p:cond delay="indefinite"/>
+                      </p:stCondLst>
+                      <p:childTnLst>
+                        <p:par>
+                          <p:cTn id="4" fill="hold">
+                            <p:stCondLst>
+                              <p:cond delay="0"/>
+                            </p:stCondLst>
+                            <p:childTnLst>
+                              <p:par>
+                                <p:cTn id="5" presetID="1" presetClass="entr" presetSubtype="0" fill="hold" grpId="0" nodeType="clickEffect">
+                                  <p:stCondLst>
+                                    <p:cond delay="0"/>
+                                  </p:stCondLst>
+                                  <p:childTnLst>
+                                    <p:set>
+                                      <p:cBhvr>
+                                        <p:cTn id="6" dur="1" fill="hold">
+                                          <p:stCondLst>
+                                            <p:cond delay="0"/>
+                                          </p:stCondLst>
+                                        </p:cTn>
+                                        <p:tgtEl>
+                                          <p:spTgt spid="9"/>
+                                        </p:tgtEl>
+                                        <p:attrNameLst>
+                                          <p:attrName>style.visibility</p:attrName>
+                                        </p:attrNameLst>
+                                      </p:cBhvr>
+                                      <p:to>
+                                        <p:strVal val="visible"/>
+                                      </p:to>
+                                    </p:set>
+                                  </p:childTnLst>
+                                </p:cTn>
+                              </p:par>
+                            </p:childTnLst>
+                          </p:cTn>
+                        </p:par>
+                      </p:childTnLst>
+                    </p:cTn>
+                  </p:par>
+                </p:childTnLst>
+              </p:cTn>
+              <p:prevCondLst>
+                <p:cond evt="onPrev" delay="0">
+                  <p:tgtEl>
+                    <p:sldTgt/>
+                  </p:tgtEl>
+                </p:cond>
+              </p:prevCondLst>
+              <p:nextCondLst>
+                <p:cond evt="onNext" delay="0">
+                  <p:tgtEl>
+                    <p:sldTgt/>
+                  </p:tgtEl>
+                </p:cond>
+              </p:nextCondLst>
+            </p:seq>
+          </p:childTnLst>
+        </p:cTn>
+      </p:par>
+    </p:tnLst>
+    <p:bldLst>
+      <p:bldP spid="9" grpId="0"/>
+    </p:bldLst>
+  </p:timing>
+</p:sld>
+</file>
+
+<file path=ppt/slides/slide5.xml><?xml version="1.0" encoding="utf-8"?>
 <p:sld xmlns:a="http://schemas.openxmlformats.org/drawingml/2006/main" xmlns:r="http://schemas.openxmlformats.org/officeDocument/2006/relationships" xmlns:p="http://schemas.openxmlformats.org/presentationml/2006/main">
   <p:cSld>
     <p:spTree>
@@ -3535,7 +4511,7 @@
 </p:sld>
 </file>
 
-<file path=ppt/slides/slide5.xml><?xml version="1.0" encoding="utf-8"?>
+<file path=ppt/slides/slide6.xml><?xml version="1.0" encoding="utf-8"?>
 <p:sld xmlns:a="http://schemas.openxmlformats.org/drawingml/2006/main" xmlns:r="http://schemas.openxmlformats.org/officeDocument/2006/relationships" xmlns:p="http://schemas.openxmlformats.org/presentationml/2006/main">
   <p:cSld>
     <p:spTree>
@@ -3831,7 +4807,7 @@
 </p:sld>
 </file>
 
-<file path=ppt/slides/slide6.xml><?xml version="1.0" encoding="utf-8"?>
+<file path=ppt/slides/slide7.xml><?xml version="1.0" encoding="utf-8"?>
 <p:sld xmlns:a="http://schemas.openxmlformats.org/drawingml/2006/main" xmlns:r="http://schemas.openxmlformats.org/officeDocument/2006/relationships" xmlns:p="http://schemas.openxmlformats.org/presentationml/2006/main">
   <p:cSld>
     <p:spTree>
@@ -3900,6 +4876,14 @@
                     <a:lumMod val="65000"/>
                   </a:schemeClr>
                 </a:solidFill>
+                <a:effectLst>
+                  <a:outerShdw blurRad="38100" dist="38100" dir="2700000" algn="tl">
+                    <a:srgbClr val="000000">
+                      <a:alpha val="43137"/>
+                    </a:srgbClr>
+                  </a:outerShdw>
+                </a:effectLst>
+                <a:latin typeface="Eras Light ITC" panose="020B0402030504020804" pitchFamily="34" charset="0"/>
               </a:rPr>
               <a:t>Ljus</a:t>
             </a:r>
@@ -3909,6 +4893,14 @@
                   <a:lumMod val="65000"/>
                 </a:schemeClr>
               </a:solidFill>
+              <a:effectLst>
+                <a:outerShdw blurRad="38100" dist="38100" dir="2700000" algn="tl">
+                  <a:srgbClr val="000000">
+                    <a:alpha val="43137"/>
+                  </a:srgbClr>
+                </a:outerShdw>
+              </a:effectLst>
+              <a:latin typeface="Eras Light ITC" panose="020B0402030504020804" pitchFamily="34" charset="0"/>
             </a:endParaRPr>
           </a:p>
         </p:txBody>
@@ -3992,131 +4984,6 @@
 </p:sld>
 </file>
 
-<file path=ppt/slides/slide7.xml><?xml version="1.0" encoding="utf-8"?>
-<p:sld xmlns:a="http://schemas.openxmlformats.org/drawingml/2006/main" xmlns:r="http://schemas.openxmlformats.org/officeDocument/2006/relationships" xmlns:p="http://schemas.openxmlformats.org/presentationml/2006/main">
-  <p:cSld>
-    <p:spTree>
-      <p:nvGrpSpPr>
-        <p:cNvPr id="1" name=""/>
-        <p:cNvGrpSpPr/>
-        <p:nvPr/>
-      </p:nvGrpSpPr>
-      <p:grpSpPr>
-        <a:xfrm>
-          <a:off x="0" y="0"/>
-          <a:ext cx="0" cy="0"/>
-          <a:chOff x="0" y="0"/>
-          <a:chExt cx="0" cy="0"/>
-        </a:xfrm>
-      </p:grpSpPr>
-      <p:pic>
-        <p:nvPicPr>
-          <p:cNvPr id="4" name="Platshållare för innehåll 3"/>
-          <p:cNvPicPr>
-            <a:picLocks noChangeAspect="1"/>
-          </p:cNvPicPr>
-          <p:nvPr/>
-        </p:nvPicPr>
-        <p:blipFill>
-          <a:blip r:embed="rId2">
-            <a:extLst>
-              <a:ext uri="{28A0092B-C50C-407E-A947-70E740481C1C}">
-                <a14:useLocalDpi xmlns:a14="http://schemas.microsoft.com/office/drawing/2010/main" val="0"/>
-              </a:ext>
-            </a:extLst>
-          </a:blip>
-          <a:stretch>
-            <a:fillRect/>
-          </a:stretch>
-        </p:blipFill>
-        <p:spPr>
-          <a:xfrm>
-            <a:off x="0" y="-678872"/>
-            <a:ext cx="12211520" cy="7675418"/>
-          </a:xfrm>
-          <a:prstGeom prst="rect">
-            <a:avLst/>
-          </a:prstGeom>
-        </p:spPr>
-      </p:pic>
-      <p:sp>
-        <p:nvSpPr>
-          <p:cNvPr id="2" name="Rubrik 1"/>
-          <p:cNvSpPr>
-            <a:spLocks noGrp="1"/>
-          </p:cNvSpPr>
-          <p:nvPr>
-            <p:ph type="title"/>
-          </p:nvPr>
-        </p:nvSpPr>
-        <p:spPr/>
-        <p:txBody>
-          <a:bodyPr/>
-          <a:lstStyle/>
-          <a:p>
-            <a:r>
-              <a:rPr lang="sv-SE" dirty="0" smtClean="0">
-                <a:solidFill>
-                  <a:schemeClr val="bg1">
-                    <a:lumMod val="65000"/>
-                  </a:schemeClr>
-                </a:solidFill>
-              </a:rPr>
-              <a:t>Ljus</a:t>
-            </a:r>
-            <a:endParaRPr lang="sv-SE" dirty="0">
-              <a:solidFill>
-                <a:schemeClr val="bg1">
-                  <a:lumMod val="65000"/>
-                </a:schemeClr>
-              </a:solidFill>
-            </a:endParaRPr>
-          </a:p>
-        </p:txBody>
-      </p:sp>
-      <p:sp>
-        <p:nvSpPr>
-          <p:cNvPr id="3" name="Platshållare för innehåll 2"/>
-          <p:cNvSpPr>
-            <a:spLocks noGrp="1"/>
-          </p:cNvSpPr>
-          <p:nvPr>
-            <p:ph idx="1"/>
-          </p:nvPr>
-        </p:nvSpPr>
-        <p:spPr/>
-        <p:txBody>
-          <a:bodyPr/>
-          <a:lstStyle/>
-          <a:p>
-            <a:r>
-              <a:rPr lang="sv-SE" dirty="0" smtClean="0"/>
-              <a:t>FILM SOM VISAR LJUSINTERAKTION MED FIENDER</a:t>
-            </a:r>
-            <a:endParaRPr lang="sv-SE" dirty="0"/>
-          </a:p>
-        </p:txBody>
-      </p:sp>
-    </p:spTree>
-    <p:extLst>
-      <p:ext uri="{BB962C8B-B14F-4D97-AF65-F5344CB8AC3E}">
-        <p14:creationId xmlns:p14="http://schemas.microsoft.com/office/powerpoint/2010/main" val="2268114453"/>
-      </p:ext>
-    </p:extLst>
-  </p:cSld>
-  <p:clrMapOvr>
-    <a:masterClrMapping/>
-  </p:clrMapOvr>
-  <p:timing>
-    <p:tnLst>
-      <p:par>
-        <p:cTn id="1" dur="indefinite" restart="never" nodeType="tmRoot"/>
-      </p:par>
-    </p:tnLst>
-  </p:timing>
-</p:sld>
-</file>
-
 <file path=ppt/slides/slide8.xml><?xml version="1.0" encoding="utf-8"?>
 <p:sld xmlns:a="http://schemas.openxmlformats.org/drawingml/2006/main" xmlns:r="http://schemas.openxmlformats.org/officeDocument/2006/relationships" xmlns:p="http://schemas.openxmlformats.org/presentationml/2006/main">
   <p:cSld>
@@ -4180,14 +5047,14 @@
           <a:lstStyle/>
           <a:p>
             <a:r>
-              <a:rPr lang="sv-SE" dirty="0" err="1" smtClean="0">
+              <a:rPr lang="sv-SE" dirty="0" smtClean="0">
                 <a:solidFill>
                   <a:schemeClr val="bg1">
                     <a:lumMod val="65000"/>
                   </a:schemeClr>
                 </a:solidFill>
               </a:rPr>
-              <a:t>Gamelogic</a:t>
+              <a:t>Ljus</a:t>
             </a:r>
             <a:endParaRPr lang="sv-SE" dirty="0">
               <a:solidFill>
@@ -4214,20 +5081,18 @@
           <a:bodyPr/>
           <a:lstStyle/>
           <a:p>
-            <a:endParaRPr lang="sv-SE" dirty="0">
-              <a:solidFill>
-                <a:schemeClr val="bg1">
-                  <a:lumMod val="65000"/>
-                </a:schemeClr>
-              </a:solidFill>
-            </a:endParaRPr>
+            <a:r>
+              <a:rPr lang="sv-SE" dirty="0" smtClean="0"/>
+              <a:t>FILM SOM VISAR LJUSINTERAKTION MED FIENDER</a:t>
+            </a:r>
+            <a:endParaRPr lang="sv-SE" dirty="0"/>
           </a:p>
         </p:txBody>
       </p:sp>
     </p:spTree>
     <p:extLst>
       <p:ext uri="{BB962C8B-B14F-4D97-AF65-F5344CB8AC3E}">
-        <p14:creationId xmlns:p14="http://schemas.microsoft.com/office/powerpoint/2010/main" val="2054495886"/>
+        <p14:creationId xmlns:p14="http://schemas.microsoft.com/office/powerpoint/2010/main" val="2268114453"/>
       </p:ext>
     </p:extLst>
   </p:cSld>
@@ -4307,14 +5172,14 @@
           <a:lstStyle/>
           <a:p>
             <a:r>
-              <a:rPr lang="sv-SE" dirty="0" smtClean="0">
+              <a:rPr lang="sv-SE" dirty="0" err="1" smtClean="0">
                 <a:solidFill>
                   <a:schemeClr val="bg1">
                     <a:lumMod val="65000"/>
                   </a:schemeClr>
                 </a:solidFill>
               </a:rPr>
-              <a:t>AI</a:t>
+              <a:t>Gamelogic</a:t>
             </a:r>
             <a:endParaRPr lang="sv-SE" dirty="0">
               <a:solidFill>
@@ -4354,13 +5219,20 @@
     </p:spTree>
     <p:extLst>
       <p:ext uri="{BB962C8B-B14F-4D97-AF65-F5344CB8AC3E}">
-        <p14:creationId xmlns:p14="http://schemas.microsoft.com/office/powerpoint/2010/main" val="1919556467"/>
+        <p14:creationId xmlns:p14="http://schemas.microsoft.com/office/powerpoint/2010/main" val="2054495886"/>
       </p:ext>
     </p:extLst>
   </p:cSld>
   <p:clrMapOvr>
     <a:masterClrMapping/>
   </p:clrMapOvr>
+  <p:timing>
+    <p:tnLst>
+      <p:par>
+        <p:cTn id="1" dur="indefinite" restart="never" nodeType="tmRoot"/>
+      </p:par>
+    </p:tnLst>
+  </p:timing>
 </p:sld>
 </file>
 

</xml_diff>

<commit_message>
Ändrade min presentation lite och gjorde så all text är den samma (Consistensy!)
</commit_message>
<xml_diff>
--- a/Documentation/nightlight Presentation - base.pptx
+++ b/Documentation/nightlight Presentation - base.pptx
@@ -3250,6 +3250,14 @@
                     <a:lumMod val="65000"/>
                   </a:schemeClr>
                 </a:solidFill>
+                <a:effectLst>
+                  <a:outerShdw blurRad="38100" dist="38100" dir="2700000" algn="tl">
+                    <a:srgbClr val="000000">
+                      <a:alpha val="43137"/>
+                    </a:srgbClr>
+                  </a:outerShdw>
+                </a:effectLst>
+                <a:latin typeface="Eras Light ITC" panose="020B0402030504020804" pitchFamily="34" charset="0"/>
               </a:rPr>
               <a:t>AI</a:t>
             </a:r>
@@ -3259,6 +3267,14 @@
                   <a:lumMod val="65000"/>
                 </a:schemeClr>
               </a:solidFill>
+              <a:effectLst>
+                <a:outerShdw blurRad="38100" dist="38100" dir="2700000" algn="tl">
+                  <a:srgbClr val="000000">
+                    <a:alpha val="43137"/>
+                  </a:srgbClr>
+                </a:outerShdw>
+              </a:effectLst>
+              <a:latin typeface="Eras Light ITC" panose="020B0402030504020804" pitchFamily="34" charset="0"/>
             </a:endParaRPr>
           </a:p>
         </p:txBody>
@@ -3298,6 +3314,13 @@
   <p:clrMapOvr>
     <a:masterClrMapping/>
   </p:clrMapOvr>
+  <p:timing>
+    <p:tnLst>
+      <p:par>
+        <p:cTn id="1" dur="indefinite" restart="never" nodeType="tmRoot"/>
+      </p:par>
+    </p:tnLst>
+  </p:timing>
 </p:sld>
 </file>
 
@@ -3369,6 +3392,14 @@
                     <a:lumMod val="65000"/>
                   </a:schemeClr>
                 </a:solidFill>
+                <a:effectLst>
+                  <a:outerShdw blurRad="38100" dist="38100" dir="2700000" algn="tl">
+                    <a:srgbClr val="000000">
+                      <a:alpha val="43137"/>
+                    </a:srgbClr>
+                  </a:outerShdw>
+                </a:effectLst>
+                <a:latin typeface="Eras Light ITC" panose="020B0402030504020804" pitchFamily="34" charset="0"/>
               </a:rPr>
               <a:t>Filmklipp</a:t>
             </a:r>
@@ -3378,6 +3409,14 @@
                   <a:lumMod val="65000"/>
                 </a:schemeClr>
               </a:solidFill>
+              <a:effectLst>
+                <a:outerShdw blurRad="38100" dist="38100" dir="2700000" algn="tl">
+                  <a:srgbClr val="000000">
+                    <a:alpha val="43137"/>
+                  </a:srgbClr>
+                </a:outerShdw>
+              </a:effectLst>
+              <a:latin typeface="Eras Light ITC" panose="020B0402030504020804" pitchFamily="34" charset="0"/>
             </a:endParaRPr>
           </a:p>
         </p:txBody>
@@ -3792,7 +3831,7 @@
         </p:blipFill>
         <p:spPr>
           <a:xfrm>
-            <a:off x="5515982" y="1121635"/>
+            <a:off x="5495663" y="906210"/>
             <a:ext cx="3042309" cy="2298927"/>
           </a:xfrm>
           <a:prstGeom prst="rect">
@@ -3852,7 +3891,7 @@
         </p:blipFill>
         <p:spPr>
           <a:xfrm>
-            <a:off x="3681743" y="1121635"/>
+            <a:off x="3709406" y="879293"/>
             <a:ext cx="4876548" cy="2743058"/>
           </a:xfrm>
           <a:prstGeom prst="rect">
@@ -3862,7 +3901,7 @@
       </p:pic>
       <p:pic>
         <p:nvPicPr>
-          <p:cNvPr id="11" name="Picture 10"/>
+          <p:cNvPr id="26" name="Picture 25"/>
           <p:cNvPicPr>
             <a:picLocks noChangeAspect="1"/>
           </p:cNvPicPr>
@@ -3882,17 +3921,47 @@
         </p:blipFill>
         <p:spPr>
           <a:xfrm>
-            <a:off x="5335164" y="1078634"/>
-            <a:ext cx="4744458" cy="2668758"/>
+            <a:off x="5490985" y="3725954"/>
+            <a:ext cx="2999215" cy="2232940"/>
           </a:xfrm>
           <a:prstGeom prst="rect">
             <a:avLst/>
           </a:prstGeom>
+          <a:solidFill>
+            <a:srgbClr val="FFFFFF">
+              <a:shade val="85000"/>
+            </a:srgbClr>
+          </a:solidFill>
+          <a:ln w="9525" cap="sq">
+            <a:solidFill>
+              <a:schemeClr val="tx1"/>
+            </a:solidFill>
+            <a:miter lim="800000"/>
+          </a:ln>
+          <a:effectLst>
+            <a:outerShdw blurRad="55000" dist="18000" dir="5400000" algn="tl" rotWithShape="0">
+              <a:srgbClr val="000000">
+                <a:alpha val="40000"/>
+              </a:srgbClr>
+            </a:outerShdw>
+          </a:effectLst>
+          <a:scene3d>
+            <a:camera prst="orthographicFront"/>
+            <a:lightRig rig="twoPt" dir="t">
+              <a:rot lat="0" lon="0" rev="7200000"/>
+            </a:lightRig>
+          </a:scene3d>
+          <a:sp3d>
+            <a:bevelT w="25400" h="19050"/>
+            <a:contourClr>
+              <a:srgbClr val="FFFFFF"/>
+            </a:contourClr>
+          </a:sp3d>
         </p:spPr>
       </p:pic>
       <p:pic>
         <p:nvPicPr>
-          <p:cNvPr id="16" name="Picture 15"/>
+          <p:cNvPr id="11" name="Picture 10"/>
           <p:cNvPicPr>
             <a:picLocks noChangeAspect="1"/>
           </p:cNvPicPr>
@@ -3912,8 +3981,38 @@
         </p:blipFill>
         <p:spPr>
           <a:xfrm>
-            <a:off x="5523209" y="3747392"/>
-            <a:ext cx="3589335" cy="2949018"/>
+            <a:off x="5362827" y="836292"/>
+            <a:ext cx="4744458" cy="2668758"/>
+          </a:xfrm>
+          <a:prstGeom prst="rect">
+            <a:avLst/>
+          </a:prstGeom>
+        </p:spPr>
+      </p:pic>
+      <p:pic>
+        <p:nvPicPr>
+          <p:cNvPr id="16" name="Picture 15"/>
+          <p:cNvPicPr>
+            <a:picLocks noChangeAspect="1"/>
+          </p:cNvPicPr>
+          <p:nvPr/>
+        </p:nvPicPr>
+        <p:blipFill>
+          <a:blip r:embed="rId14" cstate="print">
+            <a:extLst>
+              <a:ext uri="{28A0092B-C50C-407E-A947-70E740481C1C}">
+                <a14:useLocalDpi xmlns:a14="http://schemas.microsoft.com/office/drawing/2010/main" val="0"/>
+              </a:ext>
+            </a:extLst>
+          </a:blip>
+          <a:stretch>
+            <a:fillRect/>
+          </a:stretch>
+        </p:blipFill>
+        <p:spPr>
+          <a:xfrm>
+            <a:off x="5495663" y="3731971"/>
+            <a:ext cx="2994537" cy="2213695"/>
           </a:xfrm>
           <a:prstGeom prst="rect">
             <a:avLst/>
@@ -3925,6 +4024,252 @@
           </a:ln>
         </p:spPr>
       </p:pic>
+      <p:sp>
+        <p:nvSpPr>
+          <p:cNvPr id="22" name="TextBox 21"/>
+          <p:cNvSpPr txBox="1"/>
+          <p:nvPr/>
+        </p:nvSpPr>
+        <p:spPr>
+          <a:xfrm>
+            <a:off x="818321" y="3201144"/>
+            <a:ext cx="2420856" cy="461665"/>
+          </a:xfrm>
+          <a:prstGeom prst="rect">
+            <a:avLst/>
+          </a:prstGeom>
+          <a:noFill/>
+        </p:spPr>
+        <p:txBody>
+          <a:bodyPr wrap="none" rtlCol="0">
+            <a:spAutoFit/>
+          </a:bodyPr>
+          <a:lstStyle/>
+          <a:p>
+            <a:r>
+              <a:rPr lang="sv-SE" sz="2400" dirty="0" smtClean="0">
+                <a:solidFill>
+                  <a:schemeClr val="bg1">
+                    <a:lumMod val="65000"/>
+                  </a:schemeClr>
+                </a:solidFill>
+                <a:effectLst>
+                  <a:outerShdw blurRad="38100" dist="38100" dir="2700000" algn="tl">
+                    <a:srgbClr val="000000">
+                      <a:alpha val="43137"/>
+                    </a:srgbClr>
+                  </a:outerShdw>
+                </a:effectLst>
+                <a:latin typeface="Eras Light ITC" panose="020B0402030504020804" pitchFamily="34" charset="0"/>
+              </a:rPr>
+              <a:t>1. Huvudkaraktär</a:t>
+            </a:r>
+            <a:r>
+              <a:rPr lang="sv-SE" dirty="0" smtClean="0"/>
+              <a:t>:</a:t>
+            </a:r>
+            <a:endParaRPr lang="sv-SE" dirty="0"/>
+          </a:p>
+        </p:txBody>
+      </p:sp>
+      <p:sp>
+        <p:nvSpPr>
+          <p:cNvPr id="23" name="TextBox 22"/>
+          <p:cNvSpPr txBox="1"/>
+          <p:nvPr/>
+        </p:nvSpPr>
+        <p:spPr>
+          <a:xfrm>
+            <a:off x="838199" y="5958894"/>
+            <a:ext cx="1515158" cy="461665"/>
+          </a:xfrm>
+          <a:prstGeom prst="rect">
+            <a:avLst/>
+          </a:prstGeom>
+          <a:noFill/>
+        </p:spPr>
+        <p:txBody>
+          <a:bodyPr wrap="none" rtlCol="0">
+            <a:spAutoFit/>
+          </a:bodyPr>
+          <a:lstStyle/>
+          <a:p>
+            <a:r>
+              <a:rPr lang="sv-SE" sz="2400" dirty="0">
+                <a:solidFill>
+                  <a:schemeClr val="bg1">
+                    <a:lumMod val="65000"/>
+                  </a:schemeClr>
+                </a:solidFill>
+                <a:effectLst>
+                  <a:outerShdw blurRad="38100" dist="38100" dir="2700000" algn="tl">
+                    <a:srgbClr val="000000">
+                      <a:alpha val="43137"/>
+                    </a:srgbClr>
+                  </a:outerShdw>
+                </a:effectLst>
+                <a:latin typeface="Eras Light ITC" panose="020B0402030504020804" pitchFamily="34" charset="0"/>
+              </a:rPr>
+              <a:t>2</a:t>
+            </a:r>
+            <a:r>
+              <a:rPr lang="sv-SE" sz="2400" dirty="0" smtClean="0">
+                <a:solidFill>
+                  <a:schemeClr val="bg1">
+                    <a:lumMod val="65000"/>
+                  </a:schemeClr>
+                </a:solidFill>
+                <a:effectLst>
+                  <a:outerShdw blurRad="38100" dist="38100" dir="2700000" algn="tl">
+                    <a:srgbClr val="000000">
+                      <a:alpha val="43137"/>
+                    </a:srgbClr>
+                  </a:outerShdw>
+                </a:effectLst>
+                <a:latin typeface="Eras Light ITC" panose="020B0402030504020804" pitchFamily="34" charset="0"/>
+              </a:rPr>
+              <a:t>. Fiender</a:t>
+            </a:r>
+            <a:r>
+              <a:rPr lang="sv-SE" dirty="0" smtClean="0"/>
+              <a:t>:</a:t>
+            </a:r>
+            <a:endParaRPr lang="sv-SE" dirty="0"/>
+          </a:p>
+        </p:txBody>
+      </p:sp>
+      <p:sp>
+        <p:nvSpPr>
+          <p:cNvPr id="24" name="TextBox 23"/>
+          <p:cNvSpPr txBox="1"/>
+          <p:nvPr/>
+        </p:nvSpPr>
+        <p:spPr>
+          <a:xfrm>
+            <a:off x="5440185" y="3201144"/>
+            <a:ext cx="1279517" cy="461665"/>
+          </a:xfrm>
+          <a:prstGeom prst="rect">
+            <a:avLst/>
+          </a:prstGeom>
+          <a:noFill/>
+        </p:spPr>
+        <p:txBody>
+          <a:bodyPr wrap="none" rtlCol="0">
+            <a:spAutoFit/>
+          </a:bodyPr>
+          <a:lstStyle/>
+          <a:p>
+            <a:r>
+              <a:rPr lang="sv-SE" sz="2400" dirty="0">
+                <a:solidFill>
+                  <a:schemeClr val="bg1">
+                    <a:lumMod val="65000"/>
+                  </a:schemeClr>
+                </a:solidFill>
+                <a:effectLst>
+                  <a:outerShdw blurRad="38100" dist="38100" dir="2700000" algn="tl">
+                    <a:srgbClr val="000000">
+                      <a:alpha val="43137"/>
+                    </a:srgbClr>
+                  </a:outerShdw>
+                </a:effectLst>
+                <a:latin typeface="Eras Light ITC" panose="020B0402030504020804" pitchFamily="34" charset="0"/>
+              </a:rPr>
+              <a:t>3</a:t>
+            </a:r>
+            <a:r>
+              <a:rPr lang="sv-SE" sz="2400" dirty="0" smtClean="0">
+                <a:solidFill>
+                  <a:schemeClr val="bg1">
+                    <a:lumMod val="65000"/>
+                  </a:schemeClr>
+                </a:solidFill>
+                <a:effectLst>
+                  <a:outerShdw blurRad="38100" dist="38100" dir="2700000" algn="tl">
+                    <a:srgbClr val="000000">
+                      <a:alpha val="43137"/>
+                    </a:srgbClr>
+                  </a:outerShdw>
+                </a:effectLst>
+                <a:latin typeface="Eras Light ITC" panose="020B0402030504020804" pitchFamily="34" charset="0"/>
+              </a:rPr>
+              <a:t>. Farfar</a:t>
+            </a:r>
+            <a:r>
+              <a:rPr lang="sv-SE" dirty="0" smtClean="0"/>
+              <a:t>:</a:t>
+            </a:r>
+            <a:endParaRPr lang="sv-SE" dirty="0"/>
+          </a:p>
+        </p:txBody>
+      </p:sp>
+      <p:sp>
+        <p:nvSpPr>
+          <p:cNvPr id="25" name="TextBox 24"/>
+          <p:cNvSpPr txBox="1"/>
+          <p:nvPr/>
+        </p:nvSpPr>
+        <p:spPr>
+          <a:xfrm>
+            <a:off x="5490985" y="5946722"/>
+            <a:ext cx="1194558" cy="461665"/>
+          </a:xfrm>
+          <a:prstGeom prst="rect">
+            <a:avLst/>
+          </a:prstGeom>
+          <a:noFill/>
+        </p:spPr>
+        <p:txBody>
+          <a:bodyPr wrap="none" rtlCol="0">
+            <a:spAutoFit/>
+          </a:bodyPr>
+          <a:lstStyle/>
+          <a:p>
+            <a:r>
+              <a:rPr lang="sv-SE" sz="2400" dirty="0" smtClean="0">
+                <a:solidFill>
+                  <a:schemeClr val="bg1">
+                    <a:lumMod val="65000"/>
+                  </a:schemeClr>
+                </a:solidFill>
+                <a:effectLst>
+                  <a:outerShdw blurRad="38100" dist="38100" dir="2700000" algn="tl">
+                    <a:srgbClr val="000000">
+                      <a:alpha val="43137"/>
+                    </a:srgbClr>
+                  </a:outerShdw>
+                </a:effectLst>
+                <a:latin typeface="Eras Light ITC" panose="020B0402030504020804" pitchFamily="34" charset="0"/>
+              </a:rPr>
+              <a:t>4. </a:t>
+            </a:r>
+            <a:r>
+              <a:rPr lang="sv-SE" sz="2400" dirty="0" err="1" smtClean="0">
+                <a:solidFill>
+                  <a:schemeClr val="bg1">
+                    <a:lumMod val="65000"/>
+                  </a:schemeClr>
+                </a:solidFill>
+                <a:effectLst>
+                  <a:outerShdw blurRad="38100" dist="38100" dir="2700000" algn="tl">
+                    <a:srgbClr val="000000">
+                      <a:alpha val="43137"/>
+                    </a:srgbClr>
+                  </a:outerShdw>
+                </a:effectLst>
+                <a:latin typeface="Eras Light ITC" panose="020B0402030504020804" pitchFamily="34" charset="0"/>
+              </a:rPr>
+              <a:t>Level</a:t>
+            </a:r>
+            <a:r>
+              <a:rPr lang="sv-SE" dirty="0" smtClean="0"/>
+              <a:t>:</a:t>
+            </a:r>
+            <a:endParaRPr lang="sv-SE" dirty="0"/>
+          </a:p>
+        </p:txBody>
+      </p:sp>
     </p:spTree>
     <p:extLst>
       <p:ext uri="{BB962C8B-B14F-4D97-AF65-F5344CB8AC3E}">
@@ -3938,9 +4283,434 @@
   <p:timing>
     <p:tnLst>
       <p:par>
-        <p:cTn id="1" dur="indefinite" restart="never" nodeType="tmRoot"/>
+        <p:cTn id="1" dur="indefinite" restart="never" nodeType="tmRoot">
+          <p:childTnLst>
+            <p:seq concurrent="1" nextAc="seek">
+              <p:cTn id="2" dur="indefinite" nodeType="mainSeq">
+                <p:childTnLst>
+                  <p:par>
+                    <p:cTn id="3" fill="hold">
+                      <p:stCondLst>
+                        <p:cond delay="indefinite"/>
+                      </p:stCondLst>
+                      <p:childTnLst>
+                        <p:par>
+                          <p:cTn id="4" fill="hold">
+                            <p:stCondLst>
+                              <p:cond delay="0"/>
+                            </p:stCondLst>
+                            <p:childTnLst>
+                              <p:par>
+                                <p:cTn id="5" presetID="1" presetClass="entr" presetSubtype="0" fill="hold" nodeType="clickEffect">
+                                  <p:stCondLst>
+                                    <p:cond delay="0"/>
+                                  </p:stCondLst>
+                                  <p:childTnLst>
+                                    <p:set>
+                                      <p:cBhvr>
+                                        <p:cTn id="6" dur="1" fill="hold">
+                                          <p:stCondLst>
+                                            <p:cond delay="0"/>
+                                          </p:stCondLst>
+                                        </p:cTn>
+                                        <p:tgtEl>
+                                          <p:spTgt spid="5"/>
+                                        </p:tgtEl>
+                                        <p:attrNameLst>
+                                          <p:attrName>style.visibility</p:attrName>
+                                        </p:attrNameLst>
+                                      </p:cBhvr>
+                                      <p:to>
+                                        <p:strVal val="visible"/>
+                                      </p:to>
+                                    </p:set>
+                                  </p:childTnLst>
+                                </p:cTn>
+                              </p:par>
+                              <p:par>
+                                <p:cTn id="7" presetID="1" presetClass="entr" presetSubtype="0" fill="hold" grpId="0" nodeType="withEffect">
+                                  <p:stCondLst>
+                                    <p:cond delay="0"/>
+                                  </p:stCondLst>
+                                  <p:childTnLst>
+                                    <p:set>
+                                      <p:cBhvr>
+                                        <p:cTn id="8" dur="1" fill="hold">
+                                          <p:stCondLst>
+                                            <p:cond delay="0"/>
+                                          </p:stCondLst>
+                                        </p:cTn>
+                                        <p:tgtEl>
+                                          <p:spTgt spid="22"/>
+                                        </p:tgtEl>
+                                        <p:attrNameLst>
+                                          <p:attrName>style.visibility</p:attrName>
+                                        </p:attrNameLst>
+                                      </p:cBhvr>
+                                      <p:to>
+                                        <p:strVal val="visible"/>
+                                      </p:to>
+                                    </p:set>
+                                  </p:childTnLst>
+                                </p:cTn>
+                              </p:par>
+                              <p:par>
+                                <p:cTn id="9" presetID="1" presetClass="entr" presetSubtype="0" fill="hold" nodeType="withEffect">
+                                  <p:stCondLst>
+                                    <p:cond delay="0"/>
+                                  </p:stCondLst>
+                                  <p:childTnLst>
+                                    <p:set>
+                                      <p:cBhvr>
+                                        <p:cTn id="10" dur="1" fill="hold">
+                                          <p:stCondLst>
+                                            <p:cond delay="0"/>
+                                          </p:stCondLst>
+                                        </p:cTn>
+                                        <p:tgtEl>
+                                          <p:spTgt spid="7"/>
+                                        </p:tgtEl>
+                                        <p:attrNameLst>
+                                          <p:attrName>style.visibility</p:attrName>
+                                        </p:attrNameLst>
+                                      </p:cBhvr>
+                                      <p:to>
+                                        <p:strVal val="visible"/>
+                                      </p:to>
+                                    </p:set>
+                                  </p:childTnLst>
+                                </p:cTn>
+                              </p:par>
+                              <p:par>
+                                <p:cTn id="11" presetID="1" presetClass="entr" presetSubtype="0" fill="hold" nodeType="withEffect">
+                                  <p:stCondLst>
+                                    <p:cond delay="0"/>
+                                  </p:stCondLst>
+                                  <p:childTnLst>
+                                    <p:set>
+                                      <p:cBhvr>
+                                        <p:cTn id="12" dur="1" fill="hold">
+                                          <p:stCondLst>
+                                            <p:cond delay="0"/>
+                                          </p:stCondLst>
+                                        </p:cTn>
+                                        <p:tgtEl>
+                                          <p:spTgt spid="6"/>
+                                        </p:tgtEl>
+                                        <p:attrNameLst>
+                                          <p:attrName>style.visibility</p:attrName>
+                                        </p:attrNameLst>
+                                      </p:cBhvr>
+                                      <p:to>
+                                        <p:strVal val="visible"/>
+                                      </p:to>
+                                    </p:set>
+                                  </p:childTnLst>
+                                </p:cTn>
+                              </p:par>
+                            </p:childTnLst>
+                          </p:cTn>
+                        </p:par>
+                      </p:childTnLst>
+                    </p:cTn>
+                  </p:par>
+                  <p:par>
+                    <p:cTn id="13" fill="hold">
+                      <p:stCondLst>
+                        <p:cond delay="indefinite"/>
+                      </p:stCondLst>
+                      <p:childTnLst>
+                        <p:par>
+                          <p:cTn id="14" fill="hold">
+                            <p:stCondLst>
+                              <p:cond delay="0"/>
+                            </p:stCondLst>
+                            <p:childTnLst>
+                              <p:par>
+                                <p:cTn id="15" presetID="1" presetClass="entr" presetSubtype="0" fill="hold" nodeType="clickEffect">
+                                  <p:stCondLst>
+                                    <p:cond delay="0"/>
+                                  </p:stCondLst>
+                                  <p:childTnLst>
+                                    <p:set>
+                                      <p:cBhvr>
+                                        <p:cTn id="16" dur="1" fill="hold">
+                                          <p:stCondLst>
+                                            <p:cond delay="0"/>
+                                          </p:stCondLst>
+                                        </p:cTn>
+                                        <p:tgtEl>
+                                          <p:spTgt spid="9"/>
+                                        </p:tgtEl>
+                                        <p:attrNameLst>
+                                          <p:attrName>style.visibility</p:attrName>
+                                        </p:attrNameLst>
+                                      </p:cBhvr>
+                                      <p:to>
+                                        <p:strVal val="visible"/>
+                                      </p:to>
+                                    </p:set>
+                                  </p:childTnLst>
+                                </p:cTn>
+                              </p:par>
+                              <p:par>
+                                <p:cTn id="17" presetID="1" presetClass="entr" presetSubtype="0" fill="hold" nodeType="withEffect">
+                                  <p:stCondLst>
+                                    <p:cond delay="0"/>
+                                  </p:stCondLst>
+                                  <p:childTnLst>
+                                    <p:set>
+                                      <p:cBhvr>
+                                        <p:cTn id="18" dur="1" fill="hold">
+                                          <p:stCondLst>
+                                            <p:cond delay="0"/>
+                                          </p:stCondLst>
+                                        </p:cTn>
+                                        <p:tgtEl>
+                                          <p:spTgt spid="8"/>
+                                        </p:tgtEl>
+                                        <p:attrNameLst>
+                                          <p:attrName>style.visibility</p:attrName>
+                                        </p:attrNameLst>
+                                      </p:cBhvr>
+                                      <p:to>
+                                        <p:strVal val="visible"/>
+                                      </p:to>
+                                    </p:set>
+                                  </p:childTnLst>
+                                </p:cTn>
+                              </p:par>
+                              <p:par>
+                                <p:cTn id="19" presetID="1" presetClass="entr" presetSubtype="0" fill="hold" grpId="0" nodeType="withEffect">
+                                  <p:stCondLst>
+                                    <p:cond delay="0"/>
+                                  </p:stCondLst>
+                                  <p:childTnLst>
+                                    <p:set>
+                                      <p:cBhvr>
+                                        <p:cTn id="20" dur="1" fill="hold">
+                                          <p:stCondLst>
+                                            <p:cond delay="0"/>
+                                          </p:stCondLst>
+                                        </p:cTn>
+                                        <p:tgtEl>
+                                          <p:spTgt spid="23"/>
+                                        </p:tgtEl>
+                                        <p:attrNameLst>
+                                          <p:attrName>style.visibility</p:attrName>
+                                        </p:attrNameLst>
+                                      </p:cBhvr>
+                                      <p:to>
+                                        <p:strVal val="visible"/>
+                                      </p:to>
+                                    </p:set>
+                                  </p:childTnLst>
+                                </p:cTn>
+                              </p:par>
+                            </p:childTnLst>
+                          </p:cTn>
+                        </p:par>
+                      </p:childTnLst>
+                    </p:cTn>
+                  </p:par>
+                  <p:par>
+                    <p:cTn id="21" fill="hold">
+                      <p:stCondLst>
+                        <p:cond delay="indefinite"/>
+                      </p:stCondLst>
+                      <p:childTnLst>
+                        <p:par>
+                          <p:cTn id="22" fill="hold">
+                            <p:stCondLst>
+                              <p:cond delay="0"/>
+                            </p:stCondLst>
+                            <p:childTnLst>
+                              <p:par>
+                                <p:cTn id="23" presetID="1" presetClass="entr" presetSubtype="0" fill="hold" grpId="0" nodeType="clickEffect">
+                                  <p:stCondLst>
+                                    <p:cond delay="0"/>
+                                  </p:stCondLst>
+                                  <p:childTnLst>
+                                    <p:set>
+                                      <p:cBhvr>
+                                        <p:cTn id="24" dur="1" fill="hold">
+                                          <p:stCondLst>
+                                            <p:cond delay="0"/>
+                                          </p:stCondLst>
+                                        </p:cTn>
+                                        <p:tgtEl>
+                                          <p:spTgt spid="24"/>
+                                        </p:tgtEl>
+                                        <p:attrNameLst>
+                                          <p:attrName>style.visibility</p:attrName>
+                                        </p:attrNameLst>
+                                      </p:cBhvr>
+                                      <p:to>
+                                        <p:strVal val="visible"/>
+                                      </p:to>
+                                    </p:set>
+                                  </p:childTnLst>
+                                </p:cTn>
+                              </p:par>
+                              <p:par>
+                                <p:cTn id="25" presetID="1" presetClass="entr" presetSubtype="0" fill="hold" nodeType="withEffect">
+                                  <p:stCondLst>
+                                    <p:cond delay="0"/>
+                                  </p:stCondLst>
+                                  <p:childTnLst>
+                                    <p:set>
+                                      <p:cBhvr>
+                                        <p:cTn id="26" dur="1" fill="hold">
+                                          <p:stCondLst>
+                                            <p:cond delay="0"/>
+                                          </p:stCondLst>
+                                        </p:cTn>
+                                        <p:tgtEl>
+                                          <p:spTgt spid="11"/>
+                                        </p:tgtEl>
+                                        <p:attrNameLst>
+                                          <p:attrName>style.visibility</p:attrName>
+                                        </p:attrNameLst>
+                                      </p:cBhvr>
+                                      <p:to>
+                                        <p:strVal val="visible"/>
+                                      </p:to>
+                                    </p:set>
+                                  </p:childTnLst>
+                                </p:cTn>
+                              </p:par>
+                              <p:par>
+                                <p:cTn id="27" presetID="1" presetClass="entr" presetSubtype="0" fill="hold" nodeType="withEffect">
+                                  <p:stCondLst>
+                                    <p:cond delay="0"/>
+                                  </p:stCondLst>
+                                  <p:childTnLst>
+                                    <p:set>
+                                      <p:cBhvr>
+                                        <p:cTn id="28" dur="1" fill="hold">
+                                          <p:stCondLst>
+                                            <p:cond delay="0"/>
+                                          </p:stCondLst>
+                                        </p:cTn>
+                                        <p:tgtEl>
+                                          <p:spTgt spid="10"/>
+                                        </p:tgtEl>
+                                        <p:attrNameLst>
+                                          <p:attrName>style.visibility</p:attrName>
+                                        </p:attrNameLst>
+                                      </p:cBhvr>
+                                      <p:to>
+                                        <p:strVal val="visible"/>
+                                      </p:to>
+                                    </p:set>
+                                  </p:childTnLst>
+                                </p:cTn>
+                              </p:par>
+                            </p:childTnLst>
+                          </p:cTn>
+                        </p:par>
+                      </p:childTnLst>
+                    </p:cTn>
+                  </p:par>
+                  <p:par>
+                    <p:cTn id="29" fill="hold">
+                      <p:stCondLst>
+                        <p:cond delay="indefinite"/>
+                      </p:stCondLst>
+                      <p:childTnLst>
+                        <p:par>
+                          <p:cTn id="30" fill="hold">
+                            <p:stCondLst>
+                              <p:cond delay="0"/>
+                            </p:stCondLst>
+                            <p:childTnLst>
+                              <p:par>
+                                <p:cTn id="31" presetID="1" presetClass="entr" presetSubtype="0" fill="hold" nodeType="clickEffect">
+                                  <p:stCondLst>
+                                    <p:cond delay="0"/>
+                                  </p:stCondLst>
+                                  <p:childTnLst>
+                                    <p:set>
+                                      <p:cBhvr>
+                                        <p:cTn id="32" dur="1" fill="hold">
+                                          <p:stCondLst>
+                                            <p:cond delay="0"/>
+                                          </p:stCondLst>
+                                        </p:cTn>
+                                        <p:tgtEl>
+                                          <p:spTgt spid="16"/>
+                                        </p:tgtEl>
+                                        <p:attrNameLst>
+                                          <p:attrName>style.visibility</p:attrName>
+                                        </p:attrNameLst>
+                                      </p:cBhvr>
+                                      <p:to>
+                                        <p:strVal val="visible"/>
+                                      </p:to>
+                                    </p:set>
+                                  </p:childTnLst>
+                                </p:cTn>
+                              </p:par>
+                              <p:par>
+                                <p:cTn id="33" presetID="1" presetClass="entr" presetSubtype="0" fill="hold" grpId="0" nodeType="withEffect">
+                                  <p:stCondLst>
+                                    <p:cond delay="0"/>
+                                  </p:stCondLst>
+                                  <p:childTnLst>
+                                    <p:set>
+                                      <p:cBhvr>
+                                        <p:cTn id="34" dur="1" fill="hold">
+                                          <p:stCondLst>
+                                            <p:cond delay="0"/>
+                                          </p:stCondLst>
+                                        </p:cTn>
+                                        <p:tgtEl>
+                                          <p:spTgt spid="25"/>
+                                        </p:tgtEl>
+                                        <p:attrNameLst>
+                                          <p:attrName>style.visibility</p:attrName>
+                                        </p:attrNameLst>
+                                      </p:cBhvr>
+                                      <p:to>
+                                        <p:strVal val="visible"/>
+                                      </p:to>
+                                    </p:set>
+                                  </p:childTnLst>
+                                </p:cTn>
+                              </p:par>
+                            </p:childTnLst>
+                          </p:cTn>
+                        </p:par>
+                      </p:childTnLst>
+                    </p:cTn>
+                  </p:par>
+                </p:childTnLst>
+              </p:cTn>
+              <p:prevCondLst>
+                <p:cond evt="onPrev" delay="0">
+                  <p:tgtEl>
+                    <p:sldTgt/>
+                  </p:tgtEl>
+                </p:cond>
+              </p:prevCondLst>
+              <p:nextCondLst>
+                <p:cond evt="onNext" delay="0">
+                  <p:tgtEl>
+                    <p:sldTgt/>
+                  </p:tgtEl>
+                </p:cond>
+              </p:nextCondLst>
+            </p:seq>
+          </p:childTnLst>
+        </p:cTn>
       </p:par>
     </p:tnLst>
+    <p:bldLst>
+      <p:bldP spid="22" grpId="0"/>
+      <p:bldP spid="23" grpId="0"/>
+      <p:bldP spid="24" grpId="0"/>
+      <p:bldP spid="25" grpId="0"/>
+    </p:bldLst>
   </p:timing>
 </p:sld>
 </file>
@@ -4453,6 +5223,14 @@
                     <a:lumMod val="65000"/>
                   </a:schemeClr>
                 </a:solidFill>
+                <a:effectLst>
+                  <a:outerShdw blurRad="38100" dist="38100" dir="2700000" algn="tl">
+                    <a:srgbClr val="000000">
+                      <a:alpha val="43137"/>
+                    </a:srgbClr>
+                  </a:outerShdw>
+                </a:effectLst>
+                <a:latin typeface="Eras Light ITC" panose="020B0402030504020804" pitchFamily="34" charset="0"/>
               </a:rPr>
               <a:t>Asset Manager</a:t>
             </a:r>
@@ -4462,6 +5240,14 @@
                   <a:lumMod val="65000"/>
                 </a:schemeClr>
               </a:solidFill>
+              <a:effectLst>
+                <a:outerShdw blurRad="38100" dist="38100" dir="2700000" algn="tl">
+                  <a:srgbClr val="000000">
+                    <a:alpha val="43137"/>
+                  </a:srgbClr>
+                </a:outerShdw>
+              </a:effectLst>
+              <a:latin typeface="Eras Light ITC" panose="020B0402030504020804" pitchFamily="34" charset="0"/>
             </a:endParaRPr>
           </a:p>
         </p:txBody>
@@ -5053,6 +5839,14 @@
                     <a:lumMod val="65000"/>
                   </a:schemeClr>
                 </a:solidFill>
+                <a:effectLst>
+                  <a:outerShdw blurRad="38100" dist="38100" dir="2700000" algn="tl">
+                    <a:srgbClr val="000000">
+                      <a:alpha val="43137"/>
+                    </a:srgbClr>
+                  </a:outerShdw>
+                </a:effectLst>
+                <a:latin typeface="Eras Light ITC" panose="020B0402030504020804" pitchFamily="34" charset="0"/>
               </a:rPr>
               <a:t>Ljus</a:t>
             </a:r>
@@ -5062,6 +5856,14 @@
                   <a:lumMod val="65000"/>
                 </a:schemeClr>
               </a:solidFill>
+              <a:effectLst>
+                <a:outerShdw blurRad="38100" dist="38100" dir="2700000" algn="tl">
+                  <a:srgbClr val="000000">
+                    <a:alpha val="43137"/>
+                  </a:srgbClr>
+                </a:outerShdw>
+              </a:effectLst>
+              <a:latin typeface="Eras Light ITC" panose="020B0402030504020804" pitchFamily="34" charset="0"/>
             </a:endParaRPr>
           </a:p>
         </p:txBody>
@@ -5082,10 +5884,28 @@
           <a:lstStyle/>
           <a:p>
             <a:r>
-              <a:rPr lang="sv-SE" dirty="0" smtClean="0"/>
+              <a:rPr lang="sv-SE" dirty="0" smtClean="0">
+                <a:effectLst>
+                  <a:outerShdw blurRad="38100" dist="38100" dir="2700000" algn="tl">
+                    <a:srgbClr val="000000">
+                      <a:alpha val="43137"/>
+                    </a:srgbClr>
+                  </a:outerShdw>
+                </a:effectLst>
+                <a:latin typeface="Eras Light ITC" panose="020B0402030504020804" pitchFamily="34" charset="0"/>
+              </a:rPr>
               <a:t>FILM SOM VISAR LJUSINTERAKTION MED FIENDER</a:t>
             </a:r>
-            <a:endParaRPr lang="sv-SE" dirty="0"/>
+            <a:endParaRPr lang="sv-SE" dirty="0">
+              <a:effectLst>
+                <a:outerShdw blurRad="38100" dist="38100" dir="2700000" algn="tl">
+                  <a:srgbClr val="000000">
+                    <a:alpha val="43137"/>
+                  </a:srgbClr>
+                </a:outerShdw>
+              </a:effectLst>
+              <a:latin typeface="Eras Light ITC" panose="020B0402030504020804" pitchFamily="34" charset="0"/>
+            </a:endParaRPr>
           </a:p>
         </p:txBody>
       </p:sp>
@@ -5178,6 +5998,14 @@
                     <a:lumMod val="65000"/>
                   </a:schemeClr>
                 </a:solidFill>
+                <a:effectLst>
+                  <a:outerShdw blurRad="38100" dist="38100" dir="2700000" algn="tl">
+                    <a:srgbClr val="000000">
+                      <a:alpha val="43137"/>
+                    </a:srgbClr>
+                  </a:outerShdw>
+                </a:effectLst>
+                <a:latin typeface="Eras Light ITC" panose="020B0402030504020804" pitchFamily="34" charset="0"/>
               </a:rPr>
               <a:t>Gamelogic</a:t>
             </a:r>
@@ -5187,6 +6015,14 @@
                   <a:lumMod val="65000"/>
                 </a:schemeClr>
               </a:solidFill>
+              <a:effectLst>
+                <a:outerShdw blurRad="38100" dist="38100" dir="2700000" algn="tl">
+                  <a:srgbClr val="000000">
+                    <a:alpha val="43137"/>
+                  </a:srgbClr>
+                </a:outerShdw>
+              </a:effectLst>
+              <a:latin typeface="Eras Light ITC" panose="020B0402030504020804" pitchFamily="34" charset="0"/>
             </a:endParaRPr>
           </a:p>
         </p:txBody>

</xml_diff>

<commit_message>
Added collision pictures to the presentation.
</commit_message>
<xml_diff>
--- a/Documentation/nightlight Presentation - base.pptx
+++ b/Documentation/nightlight Presentation - base.pptx
@@ -11,10 +11,15 @@
     <p:sldId id="265" r:id="rId5"/>
     <p:sldId id="259" r:id="rId6"/>
     <p:sldId id="260" r:id="rId7"/>
-    <p:sldId id="261" r:id="rId8"/>
-    <p:sldId id="264" r:id="rId9"/>
-    <p:sldId id="262" r:id="rId10"/>
-    <p:sldId id="263" r:id="rId11"/>
+    <p:sldId id="262" r:id="rId8"/>
+    <p:sldId id="266" r:id="rId9"/>
+    <p:sldId id="267" r:id="rId10"/>
+    <p:sldId id="268" r:id="rId11"/>
+    <p:sldId id="269" r:id="rId12"/>
+    <p:sldId id="270" r:id="rId13"/>
+    <p:sldId id="261" r:id="rId14"/>
+    <p:sldId id="264" r:id="rId15"/>
+    <p:sldId id="263" r:id="rId16"/>
   </p:sldIdLst>
   <p:sldSz cx="12192000" cy="6858000"/>
   <p:notesSz cx="6858000" cy="9144000"/>
@@ -3182,6 +3187,786 @@
 </file>
 
 <file path=ppt/slides/slide10.xml><?xml version="1.0" encoding="utf-8"?>
+<p:sld xmlns:a="http://schemas.openxmlformats.org/drawingml/2006/main" xmlns:r="http://schemas.openxmlformats.org/officeDocument/2006/relationships" xmlns:p="http://schemas.openxmlformats.org/presentationml/2006/main">
+  <p:cSld>
+    <p:spTree>
+      <p:nvGrpSpPr>
+        <p:cNvPr id="1" name=""/>
+        <p:cNvGrpSpPr/>
+        <p:nvPr/>
+      </p:nvGrpSpPr>
+      <p:grpSpPr>
+        <a:xfrm>
+          <a:off x="0" y="0"/>
+          <a:ext cx="0" cy="0"/>
+          <a:chOff x="0" y="0"/>
+          <a:chExt cx="0" cy="0"/>
+        </a:xfrm>
+      </p:grpSpPr>
+      <p:pic>
+        <p:nvPicPr>
+          <p:cNvPr id="4" name="Platshållare för innehåll 3"/>
+          <p:cNvPicPr>
+            <a:picLocks noChangeAspect="1"/>
+          </p:cNvPicPr>
+          <p:nvPr/>
+        </p:nvPicPr>
+        <p:blipFill>
+          <a:blip r:embed="rId2">
+            <a:extLst>
+              <a:ext uri="{28A0092B-C50C-407E-A947-70E740481C1C}">
+                <a14:useLocalDpi xmlns:a14="http://schemas.microsoft.com/office/drawing/2010/main" val="0"/>
+              </a:ext>
+            </a:extLst>
+          </a:blip>
+          <a:stretch>
+            <a:fillRect/>
+          </a:stretch>
+        </p:blipFill>
+        <p:spPr>
+          <a:xfrm>
+            <a:off x="0" y="-678872"/>
+            <a:ext cx="12211520" cy="7675418"/>
+          </a:xfrm>
+          <a:prstGeom prst="rect">
+            <a:avLst/>
+          </a:prstGeom>
+        </p:spPr>
+      </p:pic>
+      <p:sp>
+        <p:nvSpPr>
+          <p:cNvPr id="2" name="Rubrik 1"/>
+          <p:cNvSpPr>
+            <a:spLocks noGrp="1"/>
+          </p:cNvSpPr>
+          <p:nvPr>
+            <p:ph type="title"/>
+          </p:nvPr>
+        </p:nvSpPr>
+        <p:spPr/>
+        <p:txBody>
+          <a:bodyPr/>
+          <a:lstStyle/>
+          <a:p>
+            <a:r>
+              <a:rPr lang="sv-SE" dirty="0" smtClean="0">
+                <a:solidFill>
+                  <a:schemeClr val="bg1">
+                    <a:lumMod val="65000"/>
+                  </a:schemeClr>
+                </a:solidFill>
+                <a:effectLst>
+                  <a:outerShdw blurRad="38100" dist="38100" dir="2700000" algn="tl">
+                    <a:srgbClr val="000000">
+                      <a:alpha val="43137"/>
+                    </a:srgbClr>
+                  </a:outerShdw>
+                </a:effectLst>
+                <a:latin typeface="Eras Light ITC" panose="020B0402030504020804" pitchFamily="34" charset="0"/>
+              </a:rPr>
+              <a:t>Kollisioner</a:t>
+            </a:r>
+            <a:endParaRPr lang="sv-SE" dirty="0">
+              <a:solidFill>
+                <a:schemeClr val="bg1">
+                  <a:lumMod val="65000"/>
+                </a:schemeClr>
+              </a:solidFill>
+              <a:effectLst>
+                <a:outerShdw blurRad="38100" dist="38100" dir="2700000" algn="tl">
+                  <a:srgbClr val="000000">
+                    <a:alpha val="43137"/>
+                  </a:srgbClr>
+                </a:outerShdw>
+              </a:effectLst>
+              <a:latin typeface="Eras Light ITC" panose="020B0402030504020804" pitchFamily="34" charset="0"/>
+            </a:endParaRPr>
+          </a:p>
+        </p:txBody>
+      </p:sp>
+      <p:pic>
+        <p:nvPicPr>
+          <p:cNvPr id="5" name="Bildobjekt 4"/>
+          <p:cNvPicPr>
+            <a:picLocks noChangeAspect="1"/>
+          </p:cNvPicPr>
+          <p:nvPr/>
+        </p:nvPicPr>
+        <p:blipFill>
+          <a:blip r:embed="rId3">
+            <a:extLst>
+              <a:ext uri="{28A0092B-C50C-407E-A947-70E740481C1C}">
+                <a14:useLocalDpi xmlns:a14="http://schemas.microsoft.com/office/drawing/2010/main" val="0"/>
+              </a:ext>
+            </a:extLst>
+          </a:blip>
+          <a:stretch>
+            <a:fillRect/>
+          </a:stretch>
+        </p:blipFill>
+        <p:spPr>
+          <a:xfrm>
+            <a:off x="3600000" y="790575"/>
+            <a:ext cx="5772150" cy="5276850"/>
+          </a:xfrm>
+          <a:prstGeom prst="rect">
+            <a:avLst/>
+          </a:prstGeom>
+        </p:spPr>
+      </p:pic>
+    </p:spTree>
+    <p:extLst>
+      <p:ext uri="{BB962C8B-B14F-4D97-AF65-F5344CB8AC3E}">
+        <p14:creationId xmlns:p14="http://schemas.microsoft.com/office/powerpoint/2010/main" val="3957548006"/>
+      </p:ext>
+    </p:extLst>
+  </p:cSld>
+  <p:clrMapOvr>
+    <a:masterClrMapping/>
+  </p:clrMapOvr>
+  <p:timing>
+    <p:tnLst>
+      <p:par>
+        <p:cTn id="1" dur="indefinite" restart="never" nodeType="tmRoot"/>
+      </p:par>
+    </p:tnLst>
+  </p:timing>
+</p:sld>
+</file>
+
+<file path=ppt/slides/slide11.xml><?xml version="1.0" encoding="utf-8"?>
+<p:sld xmlns:a="http://schemas.openxmlformats.org/drawingml/2006/main" xmlns:r="http://schemas.openxmlformats.org/officeDocument/2006/relationships" xmlns:p="http://schemas.openxmlformats.org/presentationml/2006/main">
+  <p:cSld>
+    <p:spTree>
+      <p:nvGrpSpPr>
+        <p:cNvPr id="1" name=""/>
+        <p:cNvGrpSpPr/>
+        <p:nvPr/>
+      </p:nvGrpSpPr>
+      <p:grpSpPr>
+        <a:xfrm>
+          <a:off x="0" y="0"/>
+          <a:ext cx="0" cy="0"/>
+          <a:chOff x="0" y="0"/>
+          <a:chExt cx="0" cy="0"/>
+        </a:xfrm>
+      </p:grpSpPr>
+      <p:pic>
+        <p:nvPicPr>
+          <p:cNvPr id="4" name="Platshållare för innehåll 3"/>
+          <p:cNvPicPr>
+            <a:picLocks noChangeAspect="1"/>
+          </p:cNvPicPr>
+          <p:nvPr/>
+        </p:nvPicPr>
+        <p:blipFill>
+          <a:blip r:embed="rId2">
+            <a:extLst>
+              <a:ext uri="{28A0092B-C50C-407E-A947-70E740481C1C}">
+                <a14:useLocalDpi xmlns:a14="http://schemas.microsoft.com/office/drawing/2010/main" val="0"/>
+              </a:ext>
+            </a:extLst>
+          </a:blip>
+          <a:stretch>
+            <a:fillRect/>
+          </a:stretch>
+        </p:blipFill>
+        <p:spPr>
+          <a:xfrm>
+            <a:off x="0" y="-678872"/>
+            <a:ext cx="12211520" cy="7675418"/>
+          </a:xfrm>
+          <a:prstGeom prst="rect">
+            <a:avLst/>
+          </a:prstGeom>
+        </p:spPr>
+      </p:pic>
+      <p:sp>
+        <p:nvSpPr>
+          <p:cNvPr id="2" name="Rubrik 1"/>
+          <p:cNvSpPr>
+            <a:spLocks noGrp="1"/>
+          </p:cNvSpPr>
+          <p:nvPr>
+            <p:ph type="title"/>
+          </p:nvPr>
+        </p:nvSpPr>
+        <p:spPr/>
+        <p:txBody>
+          <a:bodyPr/>
+          <a:lstStyle/>
+          <a:p>
+            <a:r>
+              <a:rPr lang="sv-SE" dirty="0" smtClean="0">
+                <a:solidFill>
+                  <a:schemeClr val="bg1">
+                    <a:lumMod val="65000"/>
+                  </a:schemeClr>
+                </a:solidFill>
+                <a:effectLst>
+                  <a:outerShdw blurRad="38100" dist="38100" dir="2700000" algn="tl">
+                    <a:srgbClr val="000000">
+                      <a:alpha val="43137"/>
+                    </a:srgbClr>
+                  </a:outerShdw>
+                </a:effectLst>
+                <a:latin typeface="Eras Light ITC" panose="020B0402030504020804" pitchFamily="34" charset="0"/>
+              </a:rPr>
+              <a:t>Kollisioner</a:t>
+            </a:r>
+            <a:endParaRPr lang="sv-SE" dirty="0">
+              <a:solidFill>
+                <a:schemeClr val="bg1">
+                  <a:lumMod val="65000"/>
+                </a:schemeClr>
+              </a:solidFill>
+              <a:effectLst>
+                <a:outerShdw blurRad="38100" dist="38100" dir="2700000" algn="tl">
+                  <a:srgbClr val="000000">
+                    <a:alpha val="43137"/>
+                  </a:srgbClr>
+                </a:outerShdw>
+              </a:effectLst>
+              <a:latin typeface="Eras Light ITC" panose="020B0402030504020804" pitchFamily="34" charset="0"/>
+            </a:endParaRPr>
+          </a:p>
+        </p:txBody>
+      </p:sp>
+      <p:pic>
+        <p:nvPicPr>
+          <p:cNvPr id="5" name="Bildobjekt 4"/>
+          <p:cNvPicPr>
+            <a:picLocks noChangeAspect="1"/>
+          </p:cNvPicPr>
+          <p:nvPr/>
+        </p:nvPicPr>
+        <p:blipFill>
+          <a:blip r:embed="rId3">
+            <a:extLst>
+              <a:ext uri="{28A0092B-C50C-407E-A947-70E740481C1C}">
+                <a14:useLocalDpi xmlns:a14="http://schemas.microsoft.com/office/drawing/2010/main" val="0"/>
+              </a:ext>
+            </a:extLst>
+          </a:blip>
+          <a:stretch>
+            <a:fillRect/>
+          </a:stretch>
+        </p:blipFill>
+        <p:spPr>
+          <a:xfrm>
+            <a:off x="3600000" y="790575"/>
+            <a:ext cx="5772150" cy="5276850"/>
+          </a:xfrm>
+          <a:prstGeom prst="rect">
+            <a:avLst/>
+          </a:prstGeom>
+        </p:spPr>
+      </p:pic>
+    </p:spTree>
+    <p:extLst>
+      <p:ext uri="{BB962C8B-B14F-4D97-AF65-F5344CB8AC3E}">
+        <p14:creationId xmlns:p14="http://schemas.microsoft.com/office/powerpoint/2010/main" val="3983425622"/>
+      </p:ext>
+    </p:extLst>
+  </p:cSld>
+  <p:clrMapOvr>
+    <a:masterClrMapping/>
+  </p:clrMapOvr>
+  <p:timing>
+    <p:tnLst>
+      <p:par>
+        <p:cTn id="1" dur="indefinite" restart="never" nodeType="tmRoot"/>
+      </p:par>
+    </p:tnLst>
+  </p:timing>
+</p:sld>
+</file>
+
+<file path=ppt/slides/slide12.xml><?xml version="1.0" encoding="utf-8"?>
+<p:sld xmlns:a="http://schemas.openxmlformats.org/drawingml/2006/main" xmlns:r="http://schemas.openxmlformats.org/officeDocument/2006/relationships" xmlns:p="http://schemas.openxmlformats.org/presentationml/2006/main">
+  <p:cSld>
+    <p:spTree>
+      <p:nvGrpSpPr>
+        <p:cNvPr id="1" name=""/>
+        <p:cNvGrpSpPr/>
+        <p:nvPr/>
+      </p:nvGrpSpPr>
+      <p:grpSpPr>
+        <a:xfrm>
+          <a:off x="0" y="0"/>
+          <a:ext cx="0" cy="0"/>
+          <a:chOff x="0" y="0"/>
+          <a:chExt cx="0" cy="0"/>
+        </a:xfrm>
+      </p:grpSpPr>
+      <p:pic>
+        <p:nvPicPr>
+          <p:cNvPr id="4" name="Platshållare för innehåll 3"/>
+          <p:cNvPicPr>
+            <a:picLocks noChangeAspect="1"/>
+          </p:cNvPicPr>
+          <p:nvPr/>
+        </p:nvPicPr>
+        <p:blipFill>
+          <a:blip r:embed="rId2">
+            <a:extLst>
+              <a:ext uri="{28A0092B-C50C-407E-A947-70E740481C1C}">
+                <a14:useLocalDpi xmlns:a14="http://schemas.microsoft.com/office/drawing/2010/main" val="0"/>
+              </a:ext>
+            </a:extLst>
+          </a:blip>
+          <a:stretch>
+            <a:fillRect/>
+          </a:stretch>
+        </p:blipFill>
+        <p:spPr>
+          <a:xfrm>
+            <a:off x="0" y="-678872"/>
+            <a:ext cx="12211520" cy="7675418"/>
+          </a:xfrm>
+          <a:prstGeom prst="rect">
+            <a:avLst/>
+          </a:prstGeom>
+        </p:spPr>
+      </p:pic>
+      <p:sp>
+        <p:nvSpPr>
+          <p:cNvPr id="2" name="Rubrik 1"/>
+          <p:cNvSpPr>
+            <a:spLocks noGrp="1"/>
+          </p:cNvSpPr>
+          <p:nvPr>
+            <p:ph type="title"/>
+          </p:nvPr>
+        </p:nvSpPr>
+        <p:spPr/>
+        <p:txBody>
+          <a:bodyPr/>
+          <a:lstStyle/>
+          <a:p>
+            <a:r>
+              <a:rPr lang="sv-SE" dirty="0" smtClean="0">
+                <a:solidFill>
+                  <a:schemeClr val="bg1">
+                    <a:lumMod val="65000"/>
+                  </a:schemeClr>
+                </a:solidFill>
+                <a:effectLst>
+                  <a:outerShdw blurRad="38100" dist="38100" dir="2700000" algn="tl">
+                    <a:srgbClr val="000000">
+                      <a:alpha val="43137"/>
+                    </a:srgbClr>
+                  </a:outerShdw>
+                </a:effectLst>
+                <a:latin typeface="Eras Light ITC" panose="020B0402030504020804" pitchFamily="34" charset="0"/>
+              </a:rPr>
+              <a:t>Kollisioner</a:t>
+            </a:r>
+            <a:endParaRPr lang="sv-SE" dirty="0">
+              <a:solidFill>
+                <a:schemeClr val="bg1">
+                  <a:lumMod val="65000"/>
+                </a:schemeClr>
+              </a:solidFill>
+              <a:effectLst>
+                <a:outerShdw blurRad="38100" dist="38100" dir="2700000" algn="tl">
+                  <a:srgbClr val="000000">
+                    <a:alpha val="43137"/>
+                  </a:srgbClr>
+                </a:outerShdw>
+              </a:effectLst>
+              <a:latin typeface="Eras Light ITC" panose="020B0402030504020804" pitchFamily="34" charset="0"/>
+            </a:endParaRPr>
+          </a:p>
+        </p:txBody>
+      </p:sp>
+      <p:pic>
+        <p:nvPicPr>
+          <p:cNvPr id="5" name="Bildobjekt 4"/>
+          <p:cNvPicPr>
+            <a:picLocks noChangeAspect="1"/>
+          </p:cNvPicPr>
+          <p:nvPr/>
+        </p:nvPicPr>
+        <p:blipFill>
+          <a:blip r:embed="rId3">
+            <a:extLst>
+              <a:ext uri="{28A0092B-C50C-407E-A947-70E740481C1C}">
+                <a14:useLocalDpi xmlns:a14="http://schemas.microsoft.com/office/drawing/2010/main" val="0"/>
+              </a:ext>
+            </a:extLst>
+          </a:blip>
+          <a:stretch>
+            <a:fillRect/>
+          </a:stretch>
+        </p:blipFill>
+        <p:spPr>
+          <a:xfrm>
+            <a:off x="3600000" y="790575"/>
+            <a:ext cx="5772150" cy="5276850"/>
+          </a:xfrm>
+          <a:prstGeom prst="rect">
+            <a:avLst/>
+          </a:prstGeom>
+        </p:spPr>
+      </p:pic>
+    </p:spTree>
+    <p:extLst>
+      <p:ext uri="{BB962C8B-B14F-4D97-AF65-F5344CB8AC3E}">
+        <p14:creationId xmlns:p14="http://schemas.microsoft.com/office/powerpoint/2010/main" val="282478213"/>
+      </p:ext>
+    </p:extLst>
+  </p:cSld>
+  <p:clrMapOvr>
+    <a:masterClrMapping/>
+  </p:clrMapOvr>
+  <p:timing>
+    <p:tnLst>
+      <p:par>
+        <p:cTn id="1" dur="indefinite" restart="never" nodeType="tmRoot"/>
+      </p:par>
+    </p:tnLst>
+  </p:timing>
+</p:sld>
+</file>
+
+<file path=ppt/slides/slide13.xml><?xml version="1.0" encoding="utf-8"?>
+<p:sld xmlns:a="http://schemas.openxmlformats.org/drawingml/2006/main" xmlns:r="http://schemas.openxmlformats.org/officeDocument/2006/relationships" xmlns:p="http://schemas.openxmlformats.org/presentationml/2006/main">
+  <p:cSld>
+    <p:spTree>
+      <p:nvGrpSpPr>
+        <p:cNvPr id="1" name=""/>
+        <p:cNvGrpSpPr/>
+        <p:nvPr/>
+      </p:nvGrpSpPr>
+      <p:grpSpPr>
+        <a:xfrm>
+          <a:off x="0" y="0"/>
+          <a:ext cx="0" cy="0"/>
+          <a:chOff x="0" y="0"/>
+          <a:chExt cx="0" cy="0"/>
+        </a:xfrm>
+      </p:grpSpPr>
+      <p:pic>
+        <p:nvPicPr>
+          <p:cNvPr id="4" name="Platshållare för innehåll 3"/>
+          <p:cNvPicPr>
+            <a:picLocks noChangeAspect="1"/>
+          </p:cNvPicPr>
+          <p:nvPr/>
+        </p:nvPicPr>
+        <p:blipFill>
+          <a:blip r:embed="rId2">
+            <a:extLst>
+              <a:ext uri="{28A0092B-C50C-407E-A947-70E740481C1C}">
+                <a14:useLocalDpi xmlns:a14="http://schemas.microsoft.com/office/drawing/2010/main" val="0"/>
+              </a:ext>
+            </a:extLst>
+          </a:blip>
+          <a:stretch>
+            <a:fillRect/>
+          </a:stretch>
+        </p:blipFill>
+        <p:spPr>
+          <a:xfrm>
+            <a:off x="0" y="-678872"/>
+            <a:ext cx="12211520" cy="7675418"/>
+          </a:xfrm>
+          <a:prstGeom prst="rect">
+            <a:avLst/>
+          </a:prstGeom>
+        </p:spPr>
+      </p:pic>
+      <p:sp>
+        <p:nvSpPr>
+          <p:cNvPr id="2" name="Rubrik 1"/>
+          <p:cNvSpPr>
+            <a:spLocks noGrp="1"/>
+          </p:cNvSpPr>
+          <p:nvPr>
+            <p:ph type="title"/>
+          </p:nvPr>
+        </p:nvSpPr>
+        <p:spPr/>
+        <p:txBody>
+          <a:bodyPr/>
+          <a:lstStyle/>
+          <a:p>
+            <a:r>
+              <a:rPr lang="sv-SE" dirty="0" smtClean="0">
+                <a:solidFill>
+                  <a:schemeClr val="bg1">
+                    <a:lumMod val="65000"/>
+                  </a:schemeClr>
+                </a:solidFill>
+                <a:effectLst>
+                  <a:outerShdw blurRad="38100" dist="38100" dir="2700000" algn="tl">
+                    <a:srgbClr val="000000">
+                      <a:alpha val="43137"/>
+                    </a:srgbClr>
+                  </a:outerShdw>
+                </a:effectLst>
+                <a:latin typeface="Eras Light ITC" panose="020B0402030504020804" pitchFamily="34" charset="0"/>
+              </a:rPr>
+              <a:t>Ljus</a:t>
+            </a:r>
+            <a:endParaRPr lang="sv-SE" dirty="0">
+              <a:solidFill>
+                <a:schemeClr val="bg1">
+                  <a:lumMod val="65000"/>
+                </a:schemeClr>
+              </a:solidFill>
+              <a:effectLst>
+                <a:outerShdw blurRad="38100" dist="38100" dir="2700000" algn="tl">
+                  <a:srgbClr val="000000">
+                    <a:alpha val="43137"/>
+                  </a:srgbClr>
+                </a:outerShdw>
+              </a:effectLst>
+              <a:latin typeface="Eras Light ITC" panose="020B0402030504020804" pitchFamily="34" charset="0"/>
+            </a:endParaRPr>
+          </a:p>
+        </p:txBody>
+      </p:sp>
+      <p:pic>
+        <p:nvPicPr>
+          <p:cNvPr id="11" name="Platshållare för innehåll 10"/>
+          <p:cNvPicPr>
+            <a:picLocks noGrp="1" noChangeAspect="1"/>
+          </p:cNvPicPr>
+          <p:nvPr>
+            <p:ph idx="1"/>
+          </p:nvPr>
+        </p:nvPicPr>
+        <p:blipFill>
+          <a:blip r:embed="rId3">
+            <a:extLst>
+              <a:ext uri="{28A0092B-C50C-407E-A947-70E740481C1C}">
+                <a14:useLocalDpi xmlns:a14="http://schemas.microsoft.com/office/drawing/2010/main" val="0"/>
+              </a:ext>
+            </a:extLst>
+          </a:blip>
+          <a:stretch>
+            <a:fillRect/>
+          </a:stretch>
+        </p:blipFill>
+        <p:spPr>
+          <a:xfrm>
+            <a:off x="1790979" y="1548765"/>
+            <a:ext cx="4322521" cy="4351338"/>
+          </a:xfrm>
+        </p:spPr>
+      </p:pic>
+      <p:pic>
+        <p:nvPicPr>
+          <p:cNvPr id="12" name="Bildobjekt 11"/>
+          <p:cNvPicPr>
+            <a:picLocks noChangeAspect="1"/>
+          </p:cNvPicPr>
+          <p:nvPr/>
+        </p:nvPicPr>
+        <p:blipFill>
+          <a:blip r:embed="rId4">
+            <a:extLst>
+              <a:ext uri="{28A0092B-C50C-407E-A947-70E740481C1C}">
+                <a14:useLocalDpi xmlns:a14="http://schemas.microsoft.com/office/drawing/2010/main" val="0"/>
+              </a:ext>
+            </a:extLst>
+          </a:blip>
+          <a:stretch>
+            <a:fillRect/>
+          </a:stretch>
+        </p:blipFill>
+        <p:spPr>
+          <a:xfrm>
+            <a:off x="6830939" y="1548765"/>
+            <a:ext cx="4035181" cy="4350858"/>
+          </a:xfrm>
+          <a:prstGeom prst="rect">
+            <a:avLst/>
+          </a:prstGeom>
+        </p:spPr>
+      </p:pic>
+    </p:spTree>
+    <p:extLst>
+      <p:ext uri="{BB962C8B-B14F-4D97-AF65-F5344CB8AC3E}">
+        <p14:creationId xmlns:p14="http://schemas.microsoft.com/office/powerpoint/2010/main" val="4226949583"/>
+      </p:ext>
+    </p:extLst>
+  </p:cSld>
+  <p:clrMapOvr>
+    <a:masterClrMapping/>
+  </p:clrMapOvr>
+  <p:timing>
+    <p:tnLst>
+      <p:par>
+        <p:cTn id="1" dur="indefinite" restart="never" nodeType="tmRoot"/>
+      </p:par>
+    </p:tnLst>
+  </p:timing>
+</p:sld>
+</file>
+
+<file path=ppt/slides/slide14.xml><?xml version="1.0" encoding="utf-8"?>
+<p:sld xmlns:a="http://schemas.openxmlformats.org/drawingml/2006/main" xmlns:r="http://schemas.openxmlformats.org/officeDocument/2006/relationships" xmlns:p="http://schemas.openxmlformats.org/presentationml/2006/main">
+  <p:cSld>
+    <p:spTree>
+      <p:nvGrpSpPr>
+        <p:cNvPr id="1" name=""/>
+        <p:cNvGrpSpPr/>
+        <p:nvPr/>
+      </p:nvGrpSpPr>
+      <p:grpSpPr>
+        <a:xfrm>
+          <a:off x="0" y="0"/>
+          <a:ext cx="0" cy="0"/>
+          <a:chOff x="0" y="0"/>
+          <a:chExt cx="0" cy="0"/>
+        </a:xfrm>
+      </p:grpSpPr>
+      <p:pic>
+        <p:nvPicPr>
+          <p:cNvPr id="4" name="Platshållare för innehåll 3"/>
+          <p:cNvPicPr>
+            <a:picLocks noChangeAspect="1"/>
+          </p:cNvPicPr>
+          <p:nvPr/>
+        </p:nvPicPr>
+        <p:blipFill>
+          <a:blip r:embed="rId2">
+            <a:extLst>
+              <a:ext uri="{28A0092B-C50C-407E-A947-70E740481C1C}">
+                <a14:useLocalDpi xmlns:a14="http://schemas.microsoft.com/office/drawing/2010/main" val="0"/>
+              </a:ext>
+            </a:extLst>
+          </a:blip>
+          <a:stretch>
+            <a:fillRect/>
+          </a:stretch>
+        </p:blipFill>
+        <p:spPr>
+          <a:xfrm>
+            <a:off x="0" y="-678872"/>
+            <a:ext cx="12211520" cy="7675418"/>
+          </a:xfrm>
+          <a:prstGeom prst="rect">
+            <a:avLst/>
+          </a:prstGeom>
+        </p:spPr>
+      </p:pic>
+      <p:sp>
+        <p:nvSpPr>
+          <p:cNvPr id="2" name="Rubrik 1"/>
+          <p:cNvSpPr>
+            <a:spLocks noGrp="1"/>
+          </p:cNvSpPr>
+          <p:nvPr>
+            <p:ph type="title"/>
+          </p:nvPr>
+        </p:nvSpPr>
+        <p:spPr/>
+        <p:txBody>
+          <a:bodyPr/>
+          <a:lstStyle/>
+          <a:p>
+            <a:r>
+              <a:rPr lang="sv-SE" dirty="0" smtClean="0">
+                <a:solidFill>
+                  <a:schemeClr val="bg1">
+                    <a:lumMod val="65000"/>
+                  </a:schemeClr>
+                </a:solidFill>
+                <a:effectLst>
+                  <a:outerShdw blurRad="38100" dist="38100" dir="2700000" algn="tl">
+                    <a:srgbClr val="000000">
+                      <a:alpha val="43137"/>
+                    </a:srgbClr>
+                  </a:outerShdw>
+                </a:effectLst>
+                <a:latin typeface="Eras Light ITC" panose="020B0402030504020804" pitchFamily="34" charset="0"/>
+              </a:rPr>
+              <a:t>Ljus</a:t>
+            </a:r>
+            <a:endParaRPr lang="sv-SE" dirty="0">
+              <a:solidFill>
+                <a:schemeClr val="bg1">
+                  <a:lumMod val="65000"/>
+                </a:schemeClr>
+              </a:solidFill>
+              <a:effectLst>
+                <a:outerShdw blurRad="38100" dist="38100" dir="2700000" algn="tl">
+                  <a:srgbClr val="000000">
+                    <a:alpha val="43137"/>
+                  </a:srgbClr>
+                </a:outerShdw>
+              </a:effectLst>
+              <a:latin typeface="Eras Light ITC" panose="020B0402030504020804" pitchFamily="34" charset="0"/>
+            </a:endParaRPr>
+          </a:p>
+        </p:txBody>
+      </p:sp>
+      <p:sp>
+        <p:nvSpPr>
+          <p:cNvPr id="3" name="Platshållare för innehåll 2"/>
+          <p:cNvSpPr>
+            <a:spLocks noGrp="1"/>
+          </p:cNvSpPr>
+          <p:nvPr>
+            <p:ph idx="1"/>
+          </p:nvPr>
+        </p:nvSpPr>
+        <p:spPr/>
+        <p:txBody>
+          <a:bodyPr/>
+          <a:lstStyle/>
+          <a:p>
+            <a:r>
+              <a:rPr lang="sv-SE" dirty="0" smtClean="0">
+                <a:effectLst>
+                  <a:outerShdw blurRad="38100" dist="38100" dir="2700000" algn="tl">
+                    <a:srgbClr val="000000">
+                      <a:alpha val="43137"/>
+                    </a:srgbClr>
+                  </a:outerShdw>
+                </a:effectLst>
+                <a:latin typeface="Eras Light ITC" panose="020B0402030504020804" pitchFamily="34" charset="0"/>
+              </a:rPr>
+              <a:t>FILM SOM VISAR LJUSINTERAKTION MED FIENDER</a:t>
+            </a:r>
+            <a:endParaRPr lang="sv-SE" dirty="0">
+              <a:effectLst>
+                <a:outerShdw blurRad="38100" dist="38100" dir="2700000" algn="tl">
+                  <a:srgbClr val="000000">
+                    <a:alpha val="43137"/>
+                  </a:srgbClr>
+                </a:outerShdw>
+              </a:effectLst>
+              <a:latin typeface="Eras Light ITC" panose="020B0402030504020804" pitchFamily="34" charset="0"/>
+            </a:endParaRPr>
+          </a:p>
+        </p:txBody>
+      </p:sp>
+    </p:spTree>
+    <p:extLst>
+      <p:ext uri="{BB962C8B-B14F-4D97-AF65-F5344CB8AC3E}">
+        <p14:creationId xmlns:p14="http://schemas.microsoft.com/office/powerpoint/2010/main" val="2268114453"/>
+      </p:ext>
+    </p:extLst>
+  </p:cSld>
+  <p:clrMapOvr>
+    <a:masterClrMapping/>
+  </p:clrMapOvr>
+  <p:timing>
+    <p:tnLst>
+      <p:par>
+        <p:cTn id="1" dur="indefinite" restart="never" nodeType="tmRoot"/>
+      </p:par>
+    </p:tnLst>
+  </p:timing>
+</p:sld>
+</file>
+
+<file path=ppt/slides/slide15.xml><?xml version="1.0" encoding="utf-8"?>
 <p:sld xmlns:a="http://schemas.openxmlformats.org/drawingml/2006/main" xmlns:r="http://schemas.openxmlformats.org/officeDocument/2006/relationships" xmlns:p="http://schemas.openxmlformats.org/presentationml/2006/main">
   <p:cSld>
     <p:spTree>
@@ -5671,7 +6456,7 @@
                 </a:effectLst>
                 <a:latin typeface="Eras Light ITC" panose="020B0402030504020804" pitchFamily="34" charset="0"/>
               </a:rPr>
-              <a:t>Ljus</a:t>
+              <a:t>Kollisioner</a:t>
             </a:r>
             <a:endParaRPr lang="sv-SE" dirty="0">
               <a:solidFill>
@@ -5693,13 +6478,11 @@
       </p:sp>
       <p:pic>
         <p:nvPicPr>
-          <p:cNvPr id="11" name="Platshållare för innehåll 10"/>
+          <p:cNvPr id="11" name="Bildobjekt 10"/>
           <p:cNvPicPr>
-            <a:picLocks noGrp="1" noChangeAspect="1"/>
+            <a:picLocks noChangeAspect="1"/>
           </p:cNvPicPr>
-          <p:nvPr>
-            <p:ph idx="1"/>
-          </p:nvPr>
+          <p:nvPr/>
         </p:nvPicPr>
         <p:blipFill>
           <a:blip r:embed="rId3">
@@ -5715,35 +6498,8 @@
         </p:blipFill>
         <p:spPr>
           <a:xfrm>
-            <a:off x="1790979" y="1548765"/>
-            <a:ext cx="4322521" cy="4351338"/>
-          </a:xfrm>
-        </p:spPr>
-      </p:pic>
-      <p:pic>
-        <p:nvPicPr>
-          <p:cNvPr id="12" name="Bildobjekt 11"/>
-          <p:cNvPicPr>
-            <a:picLocks noChangeAspect="1"/>
-          </p:cNvPicPr>
-          <p:nvPr/>
-        </p:nvPicPr>
-        <p:blipFill>
-          <a:blip r:embed="rId4">
-            <a:extLst>
-              <a:ext uri="{28A0092B-C50C-407E-A947-70E740481C1C}">
-                <a14:useLocalDpi xmlns:a14="http://schemas.microsoft.com/office/drawing/2010/main" val="0"/>
-              </a:ext>
-            </a:extLst>
-          </a:blip>
-          <a:stretch>
-            <a:fillRect/>
-          </a:stretch>
-        </p:blipFill>
-        <p:spPr>
-          <a:xfrm>
-            <a:off x="6830939" y="1548765"/>
-            <a:ext cx="4035181" cy="4350858"/>
+            <a:off x="3600000" y="790575"/>
+            <a:ext cx="5772150" cy="5276850"/>
           </a:xfrm>
           <a:prstGeom prst="rect">
             <a:avLst/>
@@ -5753,7 +6509,7 @@
     </p:spTree>
     <p:extLst>
       <p:ext uri="{BB962C8B-B14F-4D97-AF65-F5344CB8AC3E}">
-        <p14:creationId xmlns:p14="http://schemas.microsoft.com/office/powerpoint/2010/main" val="4226949583"/>
+        <p14:creationId xmlns:p14="http://schemas.microsoft.com/office/powerpoint/2010/main" val="2054495886"/>
       </p:ext>
     </p:extLst>
   </p:cSld>
@@ -5848,7 +6604,7 @@
                 </a:effectLst>
                 <a:latin typeface="Eras Light ITC" panose="020B0402030504020804" pitchFamily="34" charset="0"/>
               </a:rPr>
-              <a:t>Ljus</a:t>
+              <a:t>Kollisioner</a:t>
             </a:r>
             <a:endParaRPr lang="sv-SE" dirty="0">
               <a:solidFill>
@@ -5868,51 +6624,40 @@
           </a:p>
         </p:txBody>
       </p:sp>
-      <p:sp>
-        <p:nvSpPr>
-          <p:cNvPr id="3" name="Platshållare för innehåll 2"/>
-          <p:cNvSpPr>
-            <a:spLocks noGrp="1"/>
-          </p:cNvSpPr>
-          <p:nvPr>
-            <p:ph idx="1"/>
-          </p:nvPr>
-        </p:nvSpPr>
-        <p:spPr/>
-        <p:txBody>
-          <a:bodyPr/>
-          <a:lstStyle/>
-          <a:p>
-            <a:r>
-              <a:rPr lang="sv-SE" dirty="0" smtClean="0">
-                <a:effectLst>
-                  <a:outerShdw blurRad="38100" dist="38100" dir="2700000" algn="tl">
-                    <a:srgbClr val="000000">
-                      <a:alpha val="43137"/>
-                    </a:srgbClr>
-                  </a:outerShdw>
-                </a:effectLst>
-                <a:latin typeface="Eras Light ITC" panose="020B0402030504020804" pitchFamily="34" charset="0"/>
-              </a:rPr>
-              <a:t>FILM SOM VISAR LJUSINTERAKTION MED FIENDER</a:t>
-            </a:r>
-            <a:endParaRPr lang="sv-SE" dirty="0">
-              <a:effectLst>
-                <a:outerShdw blurRad="38100" dist="38100" dir="2700000" algn="tl">
-                  <a:srgbClr val="000000">
-                    <a:alpha val="43137"/>
-                  </a:srgbClr>
-                </a:outerShdw>
-              </a:effectLst>
-              <a:latin typeface="Eras Light ITC" panose="020B0402030504020804" pitchFamily="34" charset="0"/>
-            </a:endParaRPr>
-          </a:p>
-        </p:txBody>
-      </p:sp>
+      <p:pic>
+        <p:nvPicPr>
+          <p:cNvPr id="5" name="Bildobjekt 4"/>
+          <p:cNvPicPr>
+            <a:picLocks noChangeAspect="1"/>
+          </p:cNvPicPr>
+          <p:nvPr/>
+        </p:nvPicPr>
+        <p:blipFill>
+          <a:blip r:embed="rId3">
+            <a:extLst>
+              <a:ext uri="{28A0092B-C50C-407E-A947-70E740481C1C}">
+                <a14:useLocalDpi xmlns:a14="http://schemas.microsoft.com/office/drawing/2010/main" val="0"/>
+              </a:ext>
+            </a:extLst>
+          </a:blip>
+          <a:stretch>
+            <a:fillRect/>
+          </a:stretch>
+        </p:blipFill>
+        <p:spPr>
+          <a:xfrm>
+            <a:off x="3600000" y="790575"/>
+            <a:ext cx="5772150" cy="5276850"/>
+          </a:xfrm>
+          <a:prstGeom prst="rect">
+            <a:avLst/>
+          </a:prstGeom>
+        </p:spPr>
+      </p:pic>
     </p:spTree>
     <p:extLst>
       <p:ext uri="{BB962C8B-B14F-4D97-AF65-F5344CB8AC3E}">
-        <p14:creationId xmlns:p14="http://schemas.microsoft.com/office/powerpoint/2010/main" val="2268114453"/>
+        <p14:creationId xmlns:p14="http://schemas.microsoft.com/office/powerpoint/2010/main" val="4059535814"/>
       </p:ext>
     </p:extLst>
   </p:cSld>
@@ -5992,7 +6737,7 @@
           <a:lstStyle/>
           <a:p>
             <a:r>
-              <a:rPr lang="sv-SE" dirty="0" err="1" smtClean="0">
+              <a:rPr lang="sv-SE" dirty="0" smtClean="0">
                 <a:solidFill>
                   <a:schemeClr val="bg1">
                     <a:lumMod val="65000"/>
@@ -6007,7 +6752,7 @@
                 </a:effectLst>
                 <a:latin typeface="Eras Light ITC" panose="020B0402030504020804" pitchFamily="34" charset="0"/>
               </a:rPr>
-              <a:t>Gamelogic</a:t>
+              <a:t>Kollisioner</a:t>
             </a:r>
             <a:endParaRPr lang="sv-SE" dirty="0">
               <a:solidFill>
@@ -6027,35 +6772,40 @@
           </a:p>
         </p:txBody>
       </p:sp>
-      <p:sp>
-        <p:nvSpPr>
-          <p:cNvPr id="3" name="Platshållare för innehåll 2"/>
-          <p:cNvSpPr>
-            <a:spLocks noGrp="1"/>
-          </p:cNvSpPr>
-          <p:nvPr>
-            <p:ph idx="1"/>
-          </p:nvPr>
-        </p:nvSpPr>
-        <p:spPr/>
-        <p:txBody>
-          <a:bodyPr/>
-          <a:lstStyle/>
-          <a:p>
-            <a:endParaRPr lang="sv-SE" dirty="0">
-              <a:solidFill>
-                <a:schemeClr val="bg1">
-                  <a:lumMod val="65000"/>
-                </a:schemeClr>
-              </a:solidFill>
-            </a:endParaRPr>
-          </a:p>
-        </p:txBody>
-      </p:sp>
+      <p:pic>
+        <p:nvPicPr>
+          <p:cNvPr id="5" name="Bildobjekt 4"/>
+          <p:cNvPicPr>
+            <a:picLocks noChangeAspect="1"/>
+          </p:cNvPicPr>
+          <p:nvPr/>
+        </p:nvPicPr>
+        <p:blipFill>
+          <a:blip r:embed="rId3">
+            <a:extLst>
+              <a:ext uri="{28A0092B-C50C-407E-A947-70E740481C1C}">
+                <a14:useLocalDpi xmlns:a14="http://schemas.microsoft.com/office/drawing/2010/main" val="0"/>
+              </a:ext>
+            </a:extLst>
+          </a:blip>
+          <a:stretch>
+            <a:fillRect/>
+          </a:stretch>
+        </p:blipFill>
+        <p:spPr>
+          <a:xfrm>
+            <a:off x="3600000" y="790575"/>
+            <a:ext cx="5772150" cy="5276850"/>
+          </a:xfrm>
+          <a:prstGeom prst="rect">
+            <a:avLst/>
+          </a:prstGeom>
+        </p:spPr>
+      </p:pic>
     </p:spTree>
     <p:extLst>
       <p:ext uri="{BB962C8B-B14F-4D97-AF65-F5344CB8AC3E}">
-        <p14:creationId xmlns:p14="http://schemas.microsoft.com/office/powerpoint/2010/main" val="2054495886"/>
+        <p14:creationId xmlns:p14="http://schemas.microsoft.com/office/powerpoint/2010/main" val="3937482390"/>
       </p:ext>
     </p:extLst>
   </p:cSld>

</xml_diff>